<commit_message>
feat: update guidence ppt
</commit_message>
<xml_diff>
--- a/MVVM-Clean-Migration/Guidence.pptx
+++ b/MVVM-Clean-Migration/Guidence.pptx
@@ -5,18 +5,20 @@
     <p:sldMasterId id="2147483648" r:id="rId1"/>
   </p:sldMasterIdLst>
   <p:notesMasterIdLst>
-    <p:notesMasterId r:id="rId8"/>
+    <p:notesMasterId r:id="rId10"/>
   </p:notesMasterIdLst>
   <p:handoutMasterIdLst>
-    <p:handoutMasterId r:id="rId9"/>
+    <p:handoutMasterId r:id="rId11"/>
   </p:handoutMasterIdLst>
   <p:sldIdLst>
     <p:sldId id="273" r:id="rId2"/>
-    <p:sldId id="349" r:id="rId3"/>
-    <p:sldId id="347" r:id="rId4"/>
-    <p:sldId id="348" r:id="rId5"/>
-    <p:sldId id="343" r:id="rId6"/>
-    <p:sldId id="336" r:id="rId7"/>
+    <p:sldId id="351" r:id="rId3"/>
+    <p:sldId id="349" r:id="rId4"/>
+    <p:sldId id="347" r:id="rId5"/>
+    <p:sldId id="348" r:id="rId6"/>
+    <p:sldId id="350" r:id="rId7"/>
+    <p:sldId id="343" r:id="rId8"/>
+    <p:sldId id="336" r:id="rId9"/>
   </p:sldIdLst>
   <p:sldSz cx="12192000" cy="6858000"/>
   <p:notesSz cx="6797675" cy="9926638"/>
@@ -219,7 +221,7 @@
           <a:p>
             <a:fld id="{73F4CB37-F97B-4530-B4E6-0474AB733BE3}" type="datetimeFigureOut">
               <a:rPr kumimoji="1" lang="ja-JP" altLang="en-US" smtClean="0"/>
-              <a:t>2023/8/20</a:t>
+              <a:t>2023/8/22</a:t>
             </a:fld>
             <a:endParaRPr kumimoji="1" lang="ja-JP" altLang="en-US"/>
           </a:p>
@@ -384,7 +386,7 @@
           <a:p>
             <a:fld id="{3AE129ED-E021-412F-A6BB-F29022CB135E}" type="datetimeFigureOut">
               <a:rPr kumimoji="1" lang="ja-JP" altLang="en-US" smtClean="0"/>
-              <a:t>2023/8/20</a:t>
+              <a:t>2023/8/22</a:t>
             </a:fld>
             <a:endParaRPr kumimoji="1" lang="ja-JP" altLang="en-US"/>
           </a:p>
@@ -832,7 +834,7 @@
           <a:p>
             <a:fld id="{FFC4CC46-C8F2-4731-96DE-09F553337401}" type="slidenum">
               <a:rPr kumimoji="1" lang="ja-JP" altLang="en-US" smtClean="0"/>
-              <a:t>3</a:t>
+              <a:t>2</a:t>
             </a:fld>
             <a:endParaRPr kumimoji="1" lang="ja-JP" altLang="en-US"/>
           </a:p>
@@ -841,7 +843,7 @@
     </p:spTree>
     <p:extLst>
       <p:ext uri="{BB962C8B-B14F-4D97-AF65-F5344CB8AC3E}">
-        <p14:creationId xmlns:p14="http://schemas.microsoft.com/office/powerpoint/2010/main" val="2867711796"/>
+        <p14:creationId xmlns:p14="http://schemas.microsoft.com/office/powerpoint/2010/main" val="3400883877"/>
       </p:ext>
     </p:extLst>
   </p:cSld>
@@ -925,7 +927,7 @@
     </p:spTree>
     <p:extLst>
       <p:ext uri="{BB962C8B-B14F-4D97-AF65-F5344CB8AC3E}">
-        <p14:creationId xmlns:p14="http://schemas.microsoft.com/office/powerpoint/2010/main" val="1840906456"/>
+        <p14:creationId xmlns:p14="http://schemas.microsoft.com/office/powerpoint/2010/main" val="2867711796"/>
       </p:ext>
     </p:extLst>
   </p:cSld>
@@ -1001,6 +1003,174 @@
             <a:fld id="{FFC4CC46-C8F2-4731-96DE-09F553337401}" type="slidenum">
               <a:rPr kumimoji="1" lang="ja-JP" altLang="en-US" smtClean="0"/>
               <a:t>5</a:t>
+            </a:fld>
+            <a:endParaRPr kumimoji="1" lang="ja-JP" altLang="en-US"/>
+          </a:p>
+        </p:txBody>
+      </p:sp>
+    </p:spTree>
+    <p:extLst>
+      <p:ext uri="{BB962C8B-B14F-4D97-AF65-F5344CB8AC3E}">
+        <p14:creationId xmlns:p14="http://schemas.microsoft.com/office/powerpoint/2010/main" val="1840906456"/>
+      </p:ext>
+    </p:extLst>
+  </p:cSld>
+  <p:clrMapOvr>
+    <a:masterClrMapping/>
+  </p:clrMapOvr>
+</p:notes>
+</file>
+
+<file path=ppt/notesSlides/notesSlide5.xml><?xml version="1.0" encoding="utf-8"?>
+<p:notes xmlns:a="http://schemas.openxmlformats.org/drawingml/2006/main" xmlns:r="http://schemas.openxmlformats.org/officeDocument/2006/relationships" xmlns:p="http://schemas.openxmlformats.org/presentationml/2006/main">
+  <p:cSld>
+    <p:spTree>
+      <p:nvGrpSpPr>
+        <p:cNvPr id="1" name=""/>
+        <p:cNvGrpSpPr/>
+        <p:nvPr/>
+      </p:nvGrpSpPr>
+      <p:grpSpPr>
+        <a:xfrm>
+          <a:off x="0" y="0"/>
+          <a:ext cx="0" cy="0"/>
+          <a:chOff x="0" y="0"/>
+          <a:chExt cx="0" cy="0"/>
+        </a:xfrm>
+      </p:grpSpPr>
+      <p:sp>
+        <p:nvSpPr>
+          <p:cNvPr id="2" name="スライド イメージ プレースホルダー 1"/>
+          <p:cNvSpPr>
+            <a:spLocks noGrp="1" noRot="1" noChangeAspect="1"/>
+          </p:cNvSpPr>
+          <p:nvPr>
+            <p:ph type="sldImg"/>
+          </p:nvPr>
+        </p:nvSpPr>
+        <p:spPr/>
+      </p:sp>
+      <p:sp>
+        <p:nvSpPr>
+          <p:cNvPr id="3" name="ノート プレースホルダー 2"/>
+          <p:cNvSpPr>
+            <a:spLocks noGrp="1"/>
+          </p:cNvSpPr>
+          <p:nvPr>
+            <p:ph type="body" idx="1"/>
+          </p:nvPr>
+        </p:nvSpPr>
+        <p:spPr/>
+        <p:txBody>
+          <a:bodyPr/>
+          <a:lstStyle/>
+          <a:p>
+            <a:endParaRPr kumimoji="1" lang="ja-JP" altLang="en-US"/>
+          </a:p>
+        </p:txBody>
+      </p:sp>
+      <p:sp>
+        <p:nvSpPr>
+          <p:cNvPr id="4" name="スライド番号プレースホルダー 3"/>
+          <p:cNvSpPr>
+            <a:spLocks noGrp="1"/>
+          </p:cNvSpPr>
+          <p:nvPr>
+            <p:ph type="sldNum" sz="quarter" idx="10"/>
+          </p:nvPr>
+        </p:nvSpPr>
+        <p:spPr/>
+        <p:txBody>
+          <a:bodyPr/>
+          <a:lstStyle/>
+          <a:p>
+            <a:fld id="{FFC4CC46-C8F2-4731-96DE-09F553337401}" type="slidenum">
+              <a:rPr kumimoji="1" lang="ja-JP" altLang="en-US" smtClean="0"/>
+              <a:t>6</a:t>
+            </a:fld>
+            <a:endParaRPr kumimoji="1" lang="ja-JP" altLang="en-US"/>
+          </a:p>
+        </p:txBody>
+      </p:sp>
+    </p:spTree>
+    <p:extLst>
+      <p:ext uri="{BB962C8B-B14F-4D97-AF65-F5344CB8AC3E}">
+        <p14:creationId xmlns:p14="http://schemas.microsoft.com/office/powerpoint/2010/main" val="2384119414"/>
+      </p:ext>
+    </p:extLst>
+  </p:cSld>
+  <p:clrMapOvr>
+    <a:masterClrMapping/>
+  </p:clrMapOvr>
+</p:notes>
+</file>
+
+<file path=ppt/notesSlides/notesSlide6.xml><?xml version="1.0" encoding="utf-8"?>
+<p:notes xmlns:a="http://schemas.openxmlformats.org/drawingml/2006/main" xmlns:r="http://schemas.openxmlformats.org/officeDocument/2006/relationships" xmlns:p="http://schemas.openxmlformats.org/presentationml/2006/main">
+  <p:cSld>
+    <p:spTree>
+      <p:nvGrpSpPr>
+        <p:cNvPr id="1" name=""/>
+        <p:cNvGrpSpPr/>
+        <p:nvPr/>
+      </p:nvGrpSpPr>
+      <p:grpSpPr>
+        <a:xfrm>
+          <a:off x="0" y="0"/>
+          <a:ext cx="0" cy="0"/>
+          <a:chOff x="0" y="0"/>
+          <a:chExt cx="0" cy="0"/>
+        </a:xfrm>
+      </p:grpSpPr>
+      <p:sp>
+        <p:nvSpPr>
+          <p:cNvPr id="2" name="スライド イメージ プレースホルダー 1"/>
+          <p:cNvSpPr>
+            <a:spLocks noGrp="1" noRot="1" noChangeAspect="1"/>
+          </p:cNvSpPr>
+          <p:nvPr>
+            <p:ph type="sldImg"/>
+          </p:nvPr>
+        </p:nvSpPr>
+        <p:spPr/>
+      </p:sp>
+      <p:sp>
+        <p:nvSpPr>
+          <p:cNvPr id="3" name="ノート プレースホルダー 2"/>
+          <p:cNvSpPr>
+            <a:spLocks noGrp="1"/>
+          </p:cNvSpPr>
+          <p:nvPr>
+            <p:ph type="body" idx="1"/>
+          </p:nvPr>
+        </p:nvSpPr>
+        <p:spPr/>
+        <p:txBody>
+          <a:bodyPr/>
+          <a:lstStyle/>
+          <a:p>
+            <a:endParaRPr kumimoji="1" lang="ja-JP" altLang="en-US"/>
+          </a:p>
+        </p:txBody>
+      </p:sp>
+      <p:sp>
+        <p:nvSpPr>
+          <p:cNvPr id="4" name="スライド番号プレースホルダー 3"/>
+          <p:cNvSpPr>
+            <a:spLocks noGrp="1"/>
+          </p:cNvSpPr>
+          <p:nvPr>
+            <p:ph type="sldNum" sz="quarter" idx="10"/>
+          </p:nvPr>
+        </p:nvSpPr>
+        <p:spPr/>
+        <p:txBody>
+          <a:bodyPr/>
+          <a:lstStyle/>
+          <a:p>
+            <a:fld id="{FFC4CC46-C8F2-4731-96DE-09F553337401}" type="slidenum">
+              <a:rPr kumimoji="1" lang="ja-JP" altLang="en-US" smtClean="0"/>
+              <a:t>7</a:t>
             </a:fld>
             <a:endParaRPr kumimoji="1" lang="ja-JP" altLang="en-US"/>
           </a:p>
@@ -2636,7 +2806,7 @@
           </a:ln>
           <a:extLst>
             <a:ext uri="{C572A759-6A51-4108-AA02-DFA0A04FC94B}">
-              <ma14:wrappingTextBoxFlag xmlns:ma14="http://schemas.microsoft.com/office/mac/drawingml/2011/main" xmlns="" val="1"/>
+              <ma14:wrappingTextBoxFlag xmlns="" xmlns:ma14="http://schemas.microsoft.com/office/mac/drawingml/2011/main" val="1"/>
             </a:ext>
           </a:extLst>
         </p:spPr>
@@ -3670,6 +3840,408 @@
             <p:ph type="title"/>
           </p:nvPr>
         </p:nvSpPr>
+        <p:spPr/>
+        <p:txBody>
+          <a:bodyPr>
+            <a:noAutofit/>
+          </a:bodyPr>
+          <a:lstStyle/>
+          <a:p>
+            <a:pPr algn="ctr"/>
+            <a:r>
+              <a:rPr lang="en-US" altLang="ja-JP" sz="3600" b="1" kern="0" dirty="0">
+                <a:latin typeface="Rakuten Sans" panose="020B0503020203020204" pitchFamily="34" charset="0"/>
+                <a:cs typeface="Rakuten Sans" panose="020B0503020203020204" pitchFamily="34" charset="0"/>
+              </a:rPr>
+              <a:t>Copy template</a:t>
+            </a:r>
+            <a:endParaRPr lang="ja-JP" altLang="en-US" sz="3600" b="1" kern="0" dirty="0">
+              <a:latin typeface="Rakuten Sans" panose="020B0503020203020204" pitchFamily="34" charset="0"/>
+              <a:cs typeface="Rakuten Sans" panose="020B0503020203020204" pitchFamily="34" charset="0"/>
+            </a:endParaRPr>
+          </a:p>
+        </p:txBody>
+      </p:sp>
+      <p:cxnSp>
+        <p:nvCxnSpPr>
+          <p:cNvPr id="8" name="Straight Connector 7">
+            <a:extLst>
+              <a:ext uri="{FF2B5EF4-FFF2-40B4-BE49-F238E27FC236}">
+                <a16:creationId xmlns:a16="http://schemas.microsoft.com/office/drawing/2014/main" id="{0F07A22E-5A49-9049-9297-0D650C8F1F64}"/>
+              </a:ext>
+            </a:extLst>
+          </p:cNvPr>
+          <p:cNvCxnSpPr>
+            <a:cxnSpLocks/>
+          </p:cNvCxnSpPr>
+          <p:nvPr/>
+        </p:nvCxnSpPr>
+        <p:spPr>
+          <a:xfrm>
+            <a:off x="797441" y="950071"/>
+            <a:ext cx="10047768" cy="0"/>
+          </a:xfrm>
+          <a:prstGeom prst="line">
+            <a:avLst/>
+          </a:prstGeom>
+          <a:ln/>
+        </p:spPr>
+        <p:style>
+          <a:lnRef idx="2">
+            <a:schemeClr val="dk1"/>
+          </a:lnRef>
+          <a:fillRef idx="0">
+            <a:schemeClr val="dk1"/>
+          </a:fillRef>
+          <a:effectRef idx="1">
+            <a:schemeClr val="dk1"/>
+          </a:effectRef>
+          <a:fontRef idx="minor">
+            <a:schemeClr val="tx1"/>
+          </a:fontRef>
+        </p:style>
+      </p:cxnSp>
+      <p:pic>
+        <p:nvPicPr>
+          <p:cNvPr id="13" name="Picture 12">
+            <a:extLst>
+              <a:ext uri="{FF2B5EF4-FFF2-40B4-BE49-F238E27FC236}">
+                <a16:creationId xmlns:a16="http://schemas.microsoft.com/office/drawing/2014/main" id="{C49CF637-8380-02BA-A59C-8D8AAC563FF9}"/>
+              </a:ext>
+            </a:extLst>
+          </p:cNvPr>
+          <p:cNvPicPr>
+            <a:picLocks noChangeAspect="1"/>
+          </p:cNvPicPr>
+          <p:nvPr/>
+        </p:nvPicPr>
+        <p:blipFill>
+          <a:blip r:embed="rId3"/>
+          <a:stretch>
+            <a:fillRect/>
+          </a:stretch>
+        </p:blipFill>
+        <p:spPr>
+          <a:xfrm>
+            <a:off x="957421" y="1182496"/>
+            <a:ext cx="2503415" cy="2973600"/>
+          </a:xfrm>
+          <a:prstGeom prst="rect">
+            <a:avLst/>
+          </a:prstGeom>
+          <a:solidFill>
+            <a:srgbClr val="FFFFFF">
+              <a:shade val="85000"/>
+            </a:srgbClr>
+          </a:solidFill>
+          <a:ln w="88900" cap="sq">
+            <a:solidFill>
+              <a:srgbClr val="FFFFFF"/>
+            </a:solidFill>
+            <a:miter lim="800000"/>
+          </a:ln>
+          <a:effectLst>
+            <a:outerShdw blurRad="55000" dist="18000" dir="5400000" algn="tl" rotWithShape="0">
+              <a:srgbClr val="000000">
+                <a:alpha val="40000"/>
+              </a:srgbClr>
+            </a:outerShdw>
+          </a:effectLst>
+          <a:scene3d>
+            <a:camera prst="orthographicFront"/>
+            <a:lightRig rig="twoPt" dir="t">
+              <a:rot lat="0" lon="0" rev="7200000"/>
+            </a:lightRig>
+          </a:scene3d>
+          <a:sp3d>
+            <a:bevelT w="25400" h="19050"/>
+            <a:contourClr>
+              <a:srgbClr val="FFFFFF"/>
+            </a:contourClr>
+          </a:sp3d>
+        </p:spPr>
+      </p:pic>
+      <p:sp>
+        <p:nvSpPr>
+          <p:cNvPr id="14" name="TextBox 13">
+            <a:extLst>
+              <a:ext uri="{FF2B5EF4-FFF2-40B4-BE49-F238E27FC236}">
+                <a16:creationId xmlns:a16="http://schemas.microsoft.com/office/drawing/2014/main" id="{06A1CBA2-A659-BC40-8661-1B0194715EE3}"/>
+              </a:ext>
+            </a:extLst>
+          </p:cNvPr>
+          <p:cNvSpPr txBox="1"/>
+          <p:nvPr/>
+        </p:nvSpPr>
+        <p:spPr>
+          <a:xfrm>
+            <a:off x="5034889" y="1182496"/>
+            <a:ext cx="5630978" cy="727122"/>
+          </a:xfrm>
+          <a:prstGeom prst="rect">
+            <a:avLst/>
+          </a:prstGeom>
+          <a:noFill/>
+        </p:spPr>
+        <p:txBody>
+          <a:bodyPr wrap="square" rtlCol="0">
+            <a:spAutoFit/>
+          </a:bodyPr>
+          <a:lstStyle/>
+          <a:p>
+            <a:pPr>
+              <a:lnSpc>
+                <a:spcPct val="150000"/>
+              </a:lnSpc>
+            </a:pPr>
+            <a:r>
+              <a:rPr lang="en-US" sz="3000" b="1" i="0" u="none" strike="noStrike" dirty="0">
+                <a:solidFill>
+                  <a:srgbClr val="242424"/>
+                </a:solidFill>
+                <a:effectLst/>
+                <a:latin typeface="Rakuten Sans" panose="020B0503020203020204" pitchFamily="34" charset="0"/>
+                <a:cs typeface="Rakuten Sans" panose="020B0503020203020204" pitchFamily="34" charset="0"/>
+              </a:rPr>
+              <a:t>~/Library/Developer/</a:t>
+            </a:r>
+            <a:r>
+              <a:rPr lang="en-US" sz="3000" b="1" i="0" u="none" strike="noStrike" dirty="0" err="1">
+                <a:solidFill>
+                  <a:srgbClr val="242424"/>
+                </a:solidFill>
+                <a:effectLst/>
+                <a:latin typeface="Rakuten Sans" panose="020B0503020203020204" pitchFamily="34" charset="0"/>
+                <a:cs typeface="Rakuten Sans" panose="020B0503020203020204" pitchFamily="34" charset="0"/>
+              </a:rPr>
+              <a:t>Xcode</a:t>
+            </a:r>
+            <a:r>
+              <a:rPr lang="en-US" sz="3000" b="1" i="0" u="none" strike="noStrike" dirty="0">
+                <a:solidFill>
+                  <a:srgbClr val="242424"/>
+                </a:solidFill>
+                <a:effectLst/>
+                <a:latin typeface="Rakuten Sans" panose="020B0503020203020204" pitchFamily="34" charset="0"/>
+                <a:cs typeface="Rakuten Sans" panose="020B0503020203020204" pitchFamily="34" charset="0"/>
+              </a:rPr>
+              <a:t>/</a:t>
+            </a:r>
+            <a:endParaRPr lang="en-US" sz="3000" b="1" dirty="0">
+              <a:solidFill>
+                <a:srgbClr val="FF0000"/>
+              </a:solidFill>
+              <a:effectLst/>
+              <a:latin typeface="Rakuten Sans" panose="020B0503020203020204" pitchFamily="34" charset="0"/>
+              <a:cs typeface="Rakuten Sans" panose="020B0503020203020204" pitchFamily="34" charset="0"/>
+            </a:endParaRPr>
+          </a:p>
+        </p:txBody>
+      </p:sp>
+      <p:cxnSp>
+        <p:nvCxnSpPr>
+          <p:cNvPr id="27" name="Straight Arrow Connector 26">
+            <a:extLst>
+              <a:ext uri="{FF2B5EF4-FFF2-40B4-BE49-F238E27FC236}">
+                <a16:creationId xmlns:a16="http://schemas.microsoft.com/office/drawing/2014/main" id="{F9E1A6BA-0667-7F2E-D900-C0F528E50F6C}"/>
+              </a:ext>
+            </a:extLst>
+          </p:cNvPr>
+          <p:cNvCxnSpPr>
+            <a:cxnSpLocks/>
+          </p:cNvCxnSpPr>
+          <p:nvPr/>
+        </p:nvCxnSpPr>
+        <p:spPr>
+          <a:xfrm>
+            <a:off x="4244865" y="1546057"/>
+            <a:ext cx="512713" cy="0"/>
+          </a:xfrm>
+          <a:prstGeom prst="straightConnector1">
+            <a:avLst/>
+          </a:prstGeom>
+          <a:ln w="66675">
+            <a:solidFill>
+              <a:schemeClr val="accent6">
+                <a:lumMod val="50000"/>
+              </a:schemeClr>
+            </a:solidFill>
+            <a:tailEnd type="triangle"/>
+          </a:ln>
+        </p:spPr>
+        <p:style>
+          <a:lnRef idx="1">
+            <a:schemeClr val="accent1"/>
+          </a:lnRef>
+          <a:fillRef idx="0">
+            <a:schemeClr val="accent1"/>
+          </a:fillRef>
+          <a:effectRef idx="0">
+            <a:schemeClr val="accent1"/>
+          </a:effectRef>
+          <a:fontRef idx="minor">
+            <a:schemeClr val="tx1"/>
+          </a:fontRef>
+        </p:style>
+      </p:cxnSp>
+      <p:pic>
+        <p:nvPicPr>
+          <p:cNvPr id="36" name="Picture 35" descr="A screenshot of a computer&#10;&#10;Description automatically generated">
+            <a:extLst>
+              <a:ext uri="{FF2B5EF4-FFF2-40B4-BE49-F238E27FC236}">
+                <a16:creationId xmlns:a16="http://schemas.microsoft.com/office/drawing/2014/main" id="{17493A67-0015-577D-4E17-5A2A125F2FEE}"/>
+              </a:ext>
+            </a:extLst>
+          </p:cNvPr>
+          <p:cNvPicPr>
+            <a:picLocks noChangeAspect="1"/>
+          </p:cNvPicPr>
+          <p:nvPr/>
+        </p:nvPicPr>
+        <p:blipFill>
+          <a:blip r:embed="rId4">
+            <a:extLst>
+              <a:ext uri="{28A0092B-C50C-407E-A947-70E740481C1C}">
+                <a14:useLocalDpi xmlns:a14="http://schemas.microsoft.com/office/drawing/2010/main" val="0"/>
+              </a:ext>
+            </a:extLst>
+          </a:blip>
+          <a:stretch>
+            <a:fillRect/>
+          </a:stretch>
+        </p:blipFill>
+        <p:spPr>
+          <a:xfrm>
+            <a:off x="4021597" y="2142041"/>
+            <a:ext cx="6949295" cy="4002279"/>
+          </a:xfrm>
+          <a:prstGeom prst="rect">
+            <a:avLst/>
+          </a:prstGeom>
+          <a:solidFill>
+            <a:srgbClr val="FFFFFF">
+              <a:shade val="85000"/>
+            </a:srgbClr>
+          </a:solidFill>
+          <a:ln w="88900" cap="sq">
+            <a:solidFill>
+              <a:srgbClr val="FFFFFF"/>
+            </a:solidFill>
+            <a:miter lim="800000"/>
+          </a:ln>
+          <a:effectLst>
+            <a:outerShdw blurRad="55000" dist="18000" dir="5400000" algn="tl" rotWithShape="0">
+              <a:srgbClr val="000000">
+                <a:alpha val="40000"/>
+              </a:srgbClr>
+            </a:outerShdw>
+          </a:effectLst>
+          <a:scene3d>
+            <a:camera prst="orthographicFront"/>
+            <a:lightRig rig="twoPt" dir="t">
+              <a:rot lat="0" lon="0" rev="7200000"/>
+            </a:lightRig>
+          </a:scene3d>
+          <a:sp3d>
+            <a:bevelT w="25400" h="19050"/>
+            <a:contourClr>
+              <a:srgbClr val="FFFFFF"/>
+            </a:contourClr>
+          </a:sp3d>
+        </p:spPr>
+      </p:pic>
+      <p:sp>
+        <p:nvSpPr>
+          <p:cNvPr id="37" name="Rectangle 36">
+            <a:extLst>
+              <a:ext uri="{FF2B5EF4-FFF2-40B4-BE49-F238E27FC236}">
+                <a16:creationId xmlns:a16="http://schemas.microsoft.com/office/drawing/2014/main" id="{D877651D-66F6-9AF1-5086-E5CB4D3F490F}"/>
+              </a:ext>
+            </a:extLst>
+          </p:cNvPr>
+          <p:cNvSpPr/>
+          <p:nvPr/>
+        </p:nvSpPr>
+        <p:spPr>
+          <a:xfrm>
+            <a:off x="4244865" y="4289007"/>
+            <a:ext cx="2256296" cy="1766105"/>
+          </a:xfrm>
+          <a:prstGeom prst="rect">
+            <a:avLst/>
+          </a:prstGeom>
+          <a:noFill/>
+          <a:ln w="19050">
+            <a:solidFill>
+              <a:srgbClr val="FF0000"/>
+            </a:solidFill>
+          </a:ln>
+        </p:spPr>
+        <p:style>
+          <a:lnRef idx="2">
+            <a:schemeClr val="accent1">
+              <a:shade val="50000"/>
+            </a:schemeClr>
+          </a:lnRef>
+          <a:fillRef idx="1">
+            <a:schemeClr val="accent1"/>
+          </a:fillRef>
+          <a:effectRef idx="0">
+            <a:schemeClr val="accent1"/>
+          </a:effectRef>
+          <a:fontRef idx="minor">
+            <a:schemeClr val="lt1"/>
+          </a:fontRef>
+        </p:style>
+        <p:txBody>
+          <a:bodyPr rtlCol="0" anchor="ctr"/>
+          <a:lstStyle/>
+          <a:p>
+            <a:pPr algn="ctr"/>
+            <a:endParaRPr kumimoji="1" lang="en-JP" dirty="0"/>
+          </a:p>
+        </p:txBody>
+      </p:sp>
+    </p:spTree>
+    <p:extLst>
+      <p:ext uri="{BB962C8B-B14F-4D97-AF65-F5344CB8AC3E}">
+        <p14:creationId xmlns:p14="http://schemas.microsoft.com/office/powerpoint/2010/main" val="915905604"/>
+      </p:ext>
+    </p:extLst>
+  </p:cSld>
+  <p:clrMapOvr>
+    <a:masterClrMapping/>
+  </p:clrMapOvr>
+</p:sld>
+</file>
+
+<file path=ppt/slides/slide3.xml><?xml version="1.0" encoding="utf-8"?>
+<p:sld xmlns:a="http://schemas.openxmlformats.org/drawingml/2006/main" xmlns:r="http://schemas.openxmlformats.org/officeDocument/2006/relationships" xmlns:p="http://schemas.openxmlformats.org/presentationml/2006/main">
+  <p:cSld>
+    <p:spTree>
+      <p:nvGrpSpPr>
+        <p:cNvPr id="1" name=""/>
+        <p:cNvGrpSpPr/>
+        <p:nvPr/>
+      </p:nvGrpSpPr>
+      <p:grpSpPr>
+        <a:xfrm>
+          <a:off x="0" y="0"/>
+          <a:ext cx="0" cy="0"/>
+          <a:chOff x="0" y="0"/>
+          <a:chExt cx="0" cy="0"/>
+        </a:xfrm>
+      </p:grpSpPr>
+      <p:sp>
+        <p:nvSpPr>
+          <p:cNvPr id="2" name="タイトル 1"/>
+          <p:cNvSpPr>
+            <a:spLocks noGrp="1"/>
+          </p:cNvSpPr>
+          <p:nvPr>
+            <p:ph type="title"/>
+          </p:nvPr>
+        </p:nvSpPr>
         <p:spPr>
           <a:xfrm>
             <a:off x="240370" y="4109545"/>
@@ -3742,7 +4314,7 @@
           </a:ln>
           <a:extLst>
             <a:ext uri="{C572A759-6A51-4108-AA02-DFA0A04FC94B}">
-              <ma14:wrappingTextBoxFlag xmlns:ma14="http://schemas.microsoft.com/office/mac/drawingml/2011/main" xmlns="" val="1"/>
+              <ma14:wrappingTextBoxFlag xmlns="" xmlns:ma14="http://schemas.microsoft.com/office/mac/drawingml/2011/main" val="1"/>
             </a:ext>
           </a:extLst>
         </p:spPr>
@@ -4097,7 +4669,7 @@
 </p:sld>
 </file>
 
-<file path=ppt/slides/slide3.xml><?xml version="1.0" encoding="utf-8"?>
+<file path=ppt/slides/slide4.xml><?xml version="1.0" encoding="utf-8"?>
 <p:sld xmlns:a="http://schemas.openxmlformats.org/drawingml/2006/main" xmlns:r="http://schemas.openxmlformats.org/officeDocument/2006/relationships" xmlns:p="http://schemas.openxmlformats.org/presentationml/2006/main">
   <p:cSld>
     <p:spTree>
@@ -4114,6 +4686,72 @@
           <a:chExt cx="0" cy="0"/>
         </a:xfrm>
       </p:grpSpPr>
+      <p:pic>
+        <p:nvPicPr>
+          <p:cNvPr id="6" name="Picture 5" descr="A screenshot of a qr code&#10;&#10;Description automatically generated">
+            <a:extLst>
+              <a:ext uri="{FF2B5EF4-FFF2-40B4-BE49-F238E27FC236}">
+                <a16:creationId xmlns:a16="http://schemas.microsoft.com/office/drawing/2014/main" id="{5B752C18-986B-DC55-B347-BA2C36578541}"/>
+              </a:ext>
+            </a:extLst>
+          </p:cNvPr>
+          <p:cNvPicPr>
+            <a:picLocks noChangeAspect="1"/>
+          </p:cNvPicPr>
+          <p:nvPr/>
+        </p:nvPicPr>
+        <p:blipFill>
+          <a:blip r:embed="rId3">
+            <a:extLst>
+              <a:ext uri="{28A0092B-C50C-407E-A947-70E740481C1C}">
+                <a14:useLocalDpi xmlns:a14="http://schemas.microsoft.com/office/drawing/2010/main" val="0"/>
+              </a:ext>
+            </a:extLst>
+          </a:blip>
+          <a:stretch>
+            <a:fillRect/>
+          </a:stretch>
+        </p:blipFill>
+        <p:spPr>
+          <a:xfrm>
+            <a:off x="7142197" y="1036474"/>
+            <a:ext cx="2648812" cy="5732302"/>
+          </a:xfrm>
+          <a:prstGeom prst="rect">
+            <a:avLst/>
+          </a:prstGeom>
+          <a:solidFill>
+            <a:srgbClr val="FFFFFF">
+              <a:shade val="85000"/>
+            </a:srgbClr>
+          </a:solidFill>
+          <a:ln w="88900" cap="sq">
+            <a:solidFill>
+              <a:srgbClr val="FFFFFF"/>
+            </a:solidFill>
+            <a:miter lim="800000"/>
+          </a:ln>
+          <a:effectLst>
+            <a:outerShdw blurRad="55000" dist="18000" dir="5400000" algn="tl" rotWithShape="0">
+              <a:srgbClr val="000000">
+                <a:alpha val="40000"/>
+              </a:srgbClr>
+            </a:outerShdw>
+          </a:effectLst>
+          <a:scene3d>
+            <a:camera prst="orthographicFront"/>
+            <a:lightRig rig="twoPt" dir="t">
+              <a:rot lat="0" lon="0" rev="7200000"/>
+            </a:lightRig>
+          </a:scene3d>
+          <a:sp3d>
+            <a:bevelT w="25400" h="19050"/>
+            <a:contourClr>
+              <a:srgbClr val="FFFFFF"/>
+            </a:contourClr>
+          </a:sp3d>
+        </p:spPr>
+      </p:pic>
       <p:sp>
         <p:nvSpPr>
           <p:cNvPr id="2" name="タイトル 1"/>
@@ -4525,115 +5163,12 @@
           </a:fontRef>
         </p:style>
       </p:cxnSp>
-    </p:spTree>
-    <p:extLst>
-      <p:ext uri="{BB962C8B-B14F-4D97-AF65-F5344CB8AC3E}">
-        <p14:creationId xmlns:p14="http://schemas.microsoft.com/office/powerpoint/2010/main" val="1025249058"/>
-      </p:ext>
-    </p:extLst>
-  </p:cSld>
-  <p:clrMapOvr>
-    <a:masterClrMapping/>
-  </p:clrMapOvr>
-</p:sld>
-</file>
-
-<file path=ppt/slides/slide4.xml><?xml version="1.0" encoding="utf-8"?>
-<p:sld xmlns:a="http://schemas.openxmlformats.org/drawingml/2006/main" xmlns:r="http://schemas.openxmlformats.org/officeDocument/2006/relationships" xmlns:p="http://schemas.openxmlformats.org/presentationml/2006/main">
-  <p:cSld>
-    <p:spTree>
-      <p:nvGrpSpPr>
-        <p:cNvPr id="1" name=""/>
-        <p:cNvGrpSpPr/>
-        <p:nvPr/>
-      </p:nvGrpSpPr>
-      <p:grpSpPr>
-        <a:xfrm>
-          <a:off x="0" y="0"/>
-          <a:ext cx="0" cy="0"/>
-          <a:chOff x="0" y="0"/>
-          <a:chExt cx="0" cy="0"/>
-        </a:xfrm>
-      </p:grpSpPr>
       <p:sp>
         <p:nvSpPr>
-          <p:cNvPr id="2" name="タイトル 1"/>
-          <p:cNvSpPr>
-            <a:spLocks noGrp="1"/>
-          </p:cNvSpPr>
-          <p:nvPr>
-            <p:ph type="title"/>
-          </p:nvPr>
-        </p:nvSpPr>
-        <p:spPr/>
-        <p:txBody>
-          <a:bodyPr>
-            <a:noAutofit/>
-          </a:bodyPr>
-          <a:lstStyle/>
-          <a:p>
-            <a:pPr algn="ctr"/>
-            <a:r>
-              <a:rPr lang="en-JP" altLang="ja-JP" sz="3600" b="1" kern="0" dirty="0"/>
-              <a:t>Sep</a:t>
-            </a:r>
-            <a:r>
-              <a:rPr lang="en-US" altLang="ja-JP" sz="3600" b="1" kern="0" dirty="0"/>
-              <a:t>a</a:t>
-            </a:r>
-            <a:r>
-              <a:rPr lang="en-JP" altLang="ja-JP" sz="3600" b="1" kern="0" dirty="0"/>
-              <a:t>rate usecase into modules</a:t>
-            </a:r>
-            <a:endParaRPr lang="ja-JP" altLang="en-US" sz="3600" b="1" kern="0" dirty="0"/>
-          </a:p>
-        </p:txBody>
-      </p:sp>
-      <p:cxnSp>
-        <p:nvCxnSpPr>
-          <p:cNvPr id="8" name="Straight Connector 7">
+          <p:cNvPr id="10" name="Rectangle 9">
             <a:extLst>
               <a:ext uri="{FF2B5EF4-FFF2-40B4-BE49-F238E27FC236}">
-                <a16:creationId xmlns:a16="http://schemas.microsoft.com/office/drawing/2014/main" id="{0F07A22E-5A49-9049-9297-0D650C8F1F64}"/>
-              </a:ext>
-            </a:extLst>
-          </p:cNvPr>
-          <p:cNvCxnSpPr>
-            <a:cxnSpLocks/>
-          </p:cNvCxnSpPr>
-          <p:nvPr/>
-        </p:nvCxnSpPr>
-        <p:spPr>
-          <a:xfrm>
-            <a:off x="797441" y="950071"/>
-            <a:ext cx="10047768" cy="0"/>
-          </a:xfrm>
-          <a:prstGeom prst="line">
-            <a:avLst/>
-          </a:prstGeom>
-          <a:ln/>
-        </p:spPr>
-        <p:style>
-          <a:lnRef idx="2">
-            <a:schemeClr val="dk1"/>
-          </a:lnRef>
-          <a:fillRef idx="0">
-            <a:schemeClr val="dk1"/>
-          </a:fillRef>
-          <a:effectRef idx="1">
-            <a:schemeClr val="dk1"/>
-          </a:effectRef>
-          <a:fontRef idx="minor">
-            <a:schemeClr val="tx1"/>
-          </a:fontRef>
-        </p:style>
-      </p:cxnSp>
-      <p:sp>
-        <p:nvSpPr>
-          <p:cNvPr id="3" name="正方形/長方形 34">
-            <a:extLst>
-              <a:ext uri="{FF2B5EF4-FFF2-40B4-BE49-F238E27FC236}">
-                <a16:creationId xmlns:a16="http://schemas.microsoft.com/office/drawing/2014/main" id="{A7187707-2915-2D5A-202D-E35793A539E5}"/>
+                <a16:creationId xmlns:a16="http://schemas.microsoft.com/office/drawing/2014/main" id="{DA46A039-01AF-CE59-0EDA-09D8285F9C16}"/>
               </a:ext>
             </a:extLst>
           </p:cNvPr>
@@ -4642,19 +5177,17 @@
         </p:nvSpPr>
         <p:spPr>
           <a:xfrm>
-            <a:off x="244821" y="1690632"/>
-            <a:ext cx="1365594" cy="423145"/>
+            <a:off x="9050694" y="3229641"/>
+            <a:ext cx="384330" cy="398717"/>
           </a:xfrm>
           <a:prstGeom prst="rect">
             <a:avLst/>
           </a:prstGeom>
-          <a:solidFill>
-            <a:schemeClr val="accent6">
-              <a:lumMod val="50000"/>
-            </a:schemeClr>
-          </a:solidFill>
-          <a:ln>
-            <a:noFill/>
+          <a:noFill/>
+          <a:ln w="19050">
+            <a:solidFill>
+              <a:srgbClr val="FF0000"/>
+            </a:solidFill>
           </a:ln>
         </p:spPr>
         <p:style>
@@ -4678,1215 +5211,14 @@
           <a:lstStyle/>
           <a:p>
             <a:pPr algn="ctr"/>
-            <a:r>
-              <a:rPr kumimoji="1" lang="en-US" sz="1300" b="1" dirty="0" err="1">
-                <a:solidFill>
-                  <a:schemeClr val="bg1"/>
-                </a:solidFill>
-              </a:rPr>
-              <a:t>ViewController</a:t>
-            </a:r>
-            <a:endParaRPr kumimoji="1" lang="en-US" sz="1300" b="1" dirty="0">
-              <a:solidFill>
-                <a:schemeClr val="bg1"/>
-              </a:solidFill>
-            </a:endParaRPr>
-          </a:p>
-        </p:txBody>
-      </p:sp>
-      <p:sp>
-        <p:nvSpPr>
-          <p:cNvPr id="4" name="正方形/長方形 34">
-            <a:extLst>
-              <a:ext uri="{FF2B5EF4-FFF2-40B4-BE49-F238E27FC236}">
-                <a16:creationId xmlns:a16="http://schemas.microsoft.com/office/drawing/2014/main" id="{48FCBF24-58E7-9631-41C4-AF5D40DC66AD}"/>
-              </a:ext>
-            </a:extLst>
-          </p:cNvPr>
-          <p:cNvSpPr/>
-          <p:nvPr/>
-        </p:nvSpPr>
-        <p:spPr>
-          <a:xfrm>
-            <a:off x="2139788" y="1690297"/>
-            <a:ext cx="1302398" cy="423145"/>
-          </a:xfrm>
-          <a:prstGeom prst="rect">
-            <a:avLst/>
-          </a:prstGeom>
-          <a:solidFill>
-            <a:schemeClr val="accent6">
-              <a:lumMod val="50000"/>
-            </a:schemeClr>
-          </a:solidFill>
-          <a:ln>
-            <a:noFill/>
-          </a:ln>
-        </p:spPr>
-        <p:style>
-          <a:lnRef idx="2">
-            <a:schemeClr val="accent1">
-              <a:shade val="50000"/>
-            </a:schemeClr>
-          </a:lnRef>
-          <a:fillRef idx="1">
-            <a:schemeClr val="accent1"/>
-          </a:fillRef>
-          <a:effectRef idx="0">
-            <a:schemeClr val="accent1"/>
-          </a:effectRef>
-          <a:fontRef idx="minor">
-            <a:schemeClr val="lt1"/>
-          </a:fontRef>
-        </p:style>
-        <p:txBody>
-          <a:bodyPr rtlCol="0" anchor="ctr"/>
-          <a:lstStyle/>
-          <a:p>
-            <a:pPr algn="ctr"/>
-            <a:r>
-              <a:rPr kumimoji="1" lang="en-US" sz="1300" b="1" dirty="0" err="1">
-                <a:solidFill>
-                  <a:schemeClr val="bg1"/>
-                </a:solidFill>
-              </a:rPr>
-              <a:t>ViewModel</a:t>
-            </a:r>
-            <a:endParaRPr kumimoji="1" lang="en-US" sz="1300" b="1" dirty="0">
-              <a:solidFill>
-                <a:schemeClr val="bg1"/>
-              </a:solidFill>
-            </a:endParaRPr>
-          </a:p>
-        </p:txBody>
-      </p:sp>
-      <p:sp>
-        <p:nvSpPr>
-          <p:cNvPr id="5" name="正方形/長方形 34">
-            <a:extLst>
-              <a:ext uri="{FF2B5EF4-FFF2-40B4-BE49-F238E27FC236}">
-                <a16:creationId xmlns:a16="http://schemas.microsoft.com/office/drawing/2014/main" id="{F1E8CE5B-CE3A-97CD-AC99-87EE253EE6C9}"/>
-              </a:ext>
-            </a:extLst>
-          </p:cNvPr>
-          <p:cNvSpPr/>
-          <p:nvPr/>
-        </p:nvSpPr>
-        <p:spPr>
-          <a:xfrm>
-            <a:off x="5942464" y="1690296"/>
-            <a:ext cx="1302404" cy="423145"/>
-          </a:xfrm>
-          <a:prstGeom prst="rect">
-            <a:avLst/>
-          </a:prstGeom>
-          <a:solidFill>
-            <a:schemeClr val="accent2">
-              <a:lumMod val="50000"/>
-            </a:schemeClr>
-          </a:solidFill>
-          <a:ln>
-            <a:noFill/>
-          </a:ln>
-        </p:spPr>
-        <p:style>
-          <a:lnRef idx="2">
-            <a:schemeClr val="accent1">
-              <a:shade val="50000"/>
-            </a:schemeClr>
-          </a:lnRef>
-          <a:fillRef idx="1">
-            <a:schemeClr val="accent1"/>
-          </a:fillRef>
-          <a:effectRef idx="0">
-            <a:schemeClr val="accent1"/>
-          </a:effectRef>
-          <a:fontRef idx="minor">
-            <a:schemeClr val="lt1"/>
-          </a:fontRef>
-        </p:style>
-        <p:txBody>
-          <a:bodyPr rtlCol="0" anchor="ctr"/>
-          <a:lstStyle/>
-          <a:p>
-            <a:pPr algn="ctr"/>
-            <a:r>
-              <a:rPr kumimoji="1" lang="en-US" sz="1300" b="1" dirty="0" err="1">
-                <a:solidFill>
-                  <a:schemeClr val="bg1"/>
-                </a:solidFill>
-              </a:rPr>
-              <a:t>Use</a:t>
-            </a:r>
-            <a:r>
-              <a:rPr lang="en-US" sz="1300" b="1" dirty="0" err="1">
-                <a:solidFill>
-                  <a:schemeClr val="bg1"/>
-                </a:solidFill>
-              </a:rPr>
-              <a:t>Case</a:t>
-            </a:r>
-            <a:endParaRPr kumimoji="1" lang="en-US" sz="1300" b="1" dirty="0">
-              <a:solidFill>
-                <a:schemeClr val="bg1"/>
-              </a:solidFill>
-            </a:endParaRPr>
-          </a:p>
-        </p:txBody>
-      </p:sp>
-      <p:sp>
-        <p:nvSpPr>
-          <p:cNvPr id="7" name="正方形/長方形 34">
-            <a:extLst>
-              <a:ext uri="{FF2B5EF4-FFF2-40B4-BE49-F238E27FC236}">
-                <a16:creationId xmlns:a16="http://schemas.microsoft.com/office/drawing/2014/main" id="{14F20244-57BF-7C8D-C75C-BE6D1A638FA7}"/>
-              </a:ext>
-            </a:extLst>
-          </p:cNvPr>
-          <p:cNvSpPr/>
-          <p:nvPr/>
-        </p:nvSpPr>
-        <p:spPr>
-          <a:xfrm>
-            <a:off x="7784688" y="1697498"/>
-            <a:ext cx="1402364" cy="423145"/>
-          </a:xfrm>
-          <a:prstGeom prst="rect">
-            <a:avLst/>
-          </a:prstGeom>
-          <a:solidFill>
-            <a:schemeClr val="accent2">
-              <a:lumMod val="50000"/>
-            </a:schemeClr>
-          </a:solidFill>
-          <a:ln>
-            <a:noFill/>
-          </a:ln>
-        </p:spPr>
-        <p:style>
-          <a:lnRef idx="2">
-            <a:schemeClr val="accent1">
-              <a:shade val="50000"/>
-            </a:schemeClr>
-          </a:lnRef>
-          <a:fillRef idx="1">
-            <a:schemeClr val="accent1"/>
-          </a:fillRef>
-          <a:effectRef idx="0">
-            <a:schemeClr val="accent1"/>
-          </a:effectRef>
-          <a:fontRef idx="minor">
-            <a:schemeClr val="lt1"/>
-          </a:fontRef>
-        </p:style>
-        <p:txBody>
-          <a:bodyPr rtlCol="0" anchor="ctr"/>
-          <a:lstStyle/>
-          <a:p>
-            <a:pPr algn="ctr"/>
-            <a:r>
-              <a:rPr kumimoji="1" lang="en-US" sz="1300" b="1" dirty="0">
-                <a:solidFill>
-                  <a:schemeClr val="bg1"/>
-                </a:solidFill>
-              </a:rPr>
-              <a:t>Entity</a:t>
-            </a:r>
-          </a:p>
-        </p:txBody>
-      </p:sp>
-      <p:sp>
-        <p:nvSpPr>
-          <p:cNvPr id="9" name="正方形/長方形 34">
-            <a:extLst>
-              <a:ext uri="{FF2B5EF4-FFF2-40B4-BE49-F238E27FC236}">
-                <a16:creationId xmlns:a16="http://schemas.microsoft.com/office/drawing/2014/main" id="{C22802ED-6767-EFDC-DF26-A2BE37A4E294}"/>
-              </a:ext>
-            </a:extLst>
-          </p:cNvPr>
-          <p:cNvSpPr/>
-          <p:nvPr/>
-        </p:nvSpPr>
-        <p:spPr>
-          <a:xfrm>
-            <a:off x="244821" y="4486354"/>
-            <a:ext cx="1402357" cy="423145"/>
-          </a:xfrm>
-          <a:prstGeom prst="rect">
-            <a:avLst/>
-          </a:prstGeom>
-          <a:solidFill>
-            <a:schemeClr val="accent4">
-              <a:lumMod val="50000"/>
-            </a:schemeClr>
-          </a:solidFill>
-          <a:ln>
-            <a:noFill/>
-          </a:ln>
-        </p:spPr>
-        <p:style>
-          <a:lnRef idx="2">
-            <a:schemeClr val="accent1">
-              <a:shade val="50000"/>
-            </a:schemeClr>
-          </a:lnRef>
-          <a:fillRef idx="1">
-            <a:schemeClr val="accent1"/>
-          </a:fillRef>
-          <a:effectRef idx="0">
-            <a:schemeClr val="accent1"/>
-          </a:effectRef>
-          <a:fontRef idx="minor">
-            <a:schemeClr val="lt1"/>
-          </a:fontRef>
-        </p:style>
-        <p:txBody>
-          <a:bodyPr rtlCol="0" anchor="ctr"/>
-          <a:lstStyle/>
-          <a:p>
-            <a:pPr algn="ctr"/>
-            <a:r>
-              <a:rPr kumimoji="1" lang="en-US" sz="1300" b="1" dirty="0">
-                <a:solidFill>
-                  <a:schemeClr val="bg1"/>
-                </a:solidFill>
-              </a:rPr>
-              <a:t>Repository</a:t>
-            </a:r>
-          </a:p>
-        </p:txBody>
-      </p:sp>
-      <p:sp>
-        <p:nvSpPr>
-          <p:cNvPr id="10" name="正方形/長方形 34">
-            <a:extLst>
-              <a:ext uri="{FF2B5EF4-FFF2-40B4-BE49-F238E27FC236}">
-                <a16:creationId xmlns:a16="http://schemas.microsoft.com/office/drawing/2014/main" id="{1657F4C2-5745-15DE-D408-BF71FEE21B7C}"/>
-              </a:ext>
-            </a:extLst>
-          </p:cNvPr>
-          <p:cNvSpPr/>
-          <p:nvPr/>
-        </p:nvSpPr>
-        <p:spPr>
-          <a:xfrm>
-            <a:off x="4000285" y="1697498"/>
-            <a:ext cx="1302398" cy="423145"/>
-          </a:xfrm>
-          <a:prstGeom prst="rect">
-            <a:avLst/>
-          </a:prstGeom>
-          <a:solidFill>
-            <a:schemeClr val="accent2">
-              <a:lumMod val="50000"/>
-            </a:schemeClr>
-          </a:solidFill>
-          <a:ln>
-            <a:noFill/>
-          </a:ln>
-        </p:spPr>
-        <p:style>
-          <a:lnRef idx="2">
-            <a:schemeClr val="accent1">
-              <a:shade val="50000"/>
-            </a:schemeClr>
-          </a:lnRef>
-          <a:fillRef idx="1">
-            <a:schemeClr val="accent1"/>
-          </a:fillRef>
-          <a:effectRef idx="0">
-            <a:schemeClr val="accent1"/>
-          </a:effectRef>
-          <a:fontRef idx="minor">
-            <a:schemeClr val="lt1"/>
-          </a:fontRef>
-        </p:style>
-        <p:txBody>
-          <a:bodyPr rtlCol="0" anchor="ctr"/>
-          <a:lstStyle/>
-          <a:p>
-            <a:pPr algn="ctr"/>
-            <a:r>
-              <a:rPr kumimoji="1" lang="en-US" sz="1300" b="1" dirty="0">
-                <a:solidFill>
-                  <a:schemeClr val="bg1"/>
-                </a:solidFill>
-              </a:rPr>
-              <a:t>Model</a:t>
-            </a:r>
-          </a:p>
-        </p:txBody>
-      </p:sp>
-      <p:sp>
-        <p:nvSpPr>
-          <p:cNvPr id="11" name="正方形/長方形 34">
-            <a:extLst>
-              <a:ext uri="{FF2B5EF4-FFF2-40B4-BE49-F238E27FC236}">
-                <a16:creationId xmlns:a16="http://schemas.microsoft.com/office/drawing/2014/main" id="{A6FFF8C6-990F-C2BF-A0AF-DD9A30D57ED0}"/>
-              </a:ext>
-            </a:extLst>
-          </p:cNvPr>
-          <p:cNvSpPr/>
-          <p:nvPr/>
-        </p:nvSpPr>
-        <p:spPr>
-          <a:xfrm>
-            <a:off x="10000923" y="1690297"/>
-            <a:ext cx="1729056" cy="423145"/>
-          </a:xfrm>
-          <a:prstGeom prst="rect">
-            <a:avLst/>
-          </a:prstGeom>
-          <a:solidFill>
-            <a:schemeClr val="accent6">
-              <a:lumMod val="50000"/>
-            </a:schemeClr>
-          </a:solidFill>
-          <a:ln>
-            <a:noFill/>
-          </a:ln>
-        </p:spPr>
-        <p:style>
-          <a:lnRef idx="2">
-            <a:schemeClr val="accent1">
-              <a:shade val="50000"/>
-            </a:schemeClr>
-          </a:lnRef>
-          <a:fillRef idx="1">
-            <a:schemeClr val="accent1"/>
-          </a:fillRef>
-          <a:effectRef idx="0">
-            <a:schemeClr val="accent1"/>
-          </a:effectRef>
-          <a:fontRef idx="minor">
-            <a:schemeClr val="lt1"/>
-          </a:fontRef>
-        </p:style>
-        <p:txBody>
-          <a:bodyPr rtlCol="0" anchor="ctr"/>
-          <a:lstStyle/>
-          <a:p>
-            <a:pPr algn="ctr"/>
-            <a:r>
-              <a:rPr kumimoji="1" lang="en-US" sz="1300" b="1" dirty="0">
-                <a:solidFill>
-                  <a:schemeClr val="bg1"/>
-                </a:solidFill>
-              </a:rPr>
-              <a:t>Core Module</a:t>
-            </a:r>
-          </a:p>
-        </p:txBody>
-      </p:sp>
-      <p:cxnSp>
-        <p:nvCxnSpPr>
-          <p:cNvPr id="12" name="Straight Connector 11">
-            <a:extLst>
-              <a:ext uri="{FF2B5EF4-FFF2-40B4-BE49-F238E27FC236}">
-                <a16:creationId xmlns:a16="http://schemas.microsoft.com/office/drawing/2014/main" id="{4317C956-603C-369F-D5BB-CA037E01FCFD}"/>
-              </a:ext>
-            </a:extLst>
-          </p:cNvPr>
-          <p:cNvCxnSpPr>
-            <a:cxnSpLocks/>
-          </p:cNvCxnSpPr>
-          <p:nvPr/>
-        </p:nvCxnSpPr>
-        <p:spPr>
-          <a:xfrm>
-            <a:off x="9838251" y="1258452"/>
-            <a:ext cx="0" cy="5054940"/>
-          </a:xfrm>
-          <a:prstGeom prst="line">
-            <a:avLst/>
-          </a:prstGeom>
-          <a:ln>
-            <a:prstDash val="sysDash"/>
-          </a:ln>
-        </p:spPr>
-        <p:style>
-          <a:lnRef idx="2">
-            <a:schemeClr val="dk1"/>
-          </a:lnRef>
-          <a:fillRef idx="0">
-            <a:schemeClr val="dk1"/>
-          </a:fillRef>
-          <a:effectRef idx="1">
-            <a:schemeClr val="dk1"/>
-          </a:effectRef>
-          <a:fontRef idx="minor">
-            <a:schemeClr val="tx1"/>
-          </a:fontRef>
-        </p:style>
-      </p:cxnSp>
-      <p:sp>
-        <p:nvSpPr>
-          <p:cNvPr id="16" name="Rectangle 15">
-            <a:extLst>
-              <a:ext uri="{FF2B5EF4-FFF2-40B4-BE49-F238E27FC236}">
-                <a16:creationId xmlns:a16="http://schemas.microsoft.com/office/drawing/2014/main" id="{03E4145C-6752-EC64-D865-C92B5AC9DAFA}"/>
-              </a:ext>
-            </a:extLst>
-          </p:cNvPr>
-          <p:cNvSpPr/>
-          <p:nvPr/>
-        </p:nvSpPr>
-        <p:spPr>
-          <a:xfrm>
-            <a:off x="10000923" y="3217427"/>
-            <a:ext cx="1708814" cy="423145"/>
-          </a:xfrm>
-          <a:prstGeom prst="rect">
-            <a:avLst/>
-          </a:prstGeom>
-          <a:ln>
-            <a:noFill/>
-          </a:ln>
-        </p:spPr>
-        <p:style>
-          <a:lnRef idx="2">
-            <a:schemeClr val="accent1">
-              <a:shade val="50000"/>
-            </a:schemeClr>
-          </a:lnRef>
-          <a:fillRef idx="1">
-            <a:schemeClr val="accent1"/>
-          </a:fillRef>
-          <a:effectRef idx="0">
-            <a:schemeClr val="accent1"/>
-          </a:effectRef>
-          <a:fontRef idx="minor">
-            <a:schemeClr val="lt1"/>
-          </a:fontRef>
-        </p:style>
-        <p:txBody>
-          <a:bodyPr rtlCol="0" anchor="ctr"/>
-          <a:lstStyle/>
-          <a:p>
-            <a:pPr algn="ctr"/>
-            <a:r>
-              <a:rPr kumimoji="1" lang="en-US" sz="1500" dirty="0"/>
-              <a:t>Local persistent</a:t>
-            </a:r>
-            <a:endParaRPr kumimoji="1" lang="en-JP" sz="1500" dirty="0"/>
-          </a:p>
-        </p:txBody>
-      </p:sp>
-      <p:sp>
-        <p:nvSpPr>
-          <p:cNvPr id="17" name="Rectangle 16">
-            <a:extLst>
-              <a:ext uri="{FF2B5EF4-FFF2-40B4-BE49-F238E27FC236}">
-                <a16:creationId xmlns:a16="http://schemas.microsoft.com/office/drawing/2014/main" id="{81FE434C-EEE3-DEC6-ABB8-1CC7971211F9}"/>
-              </a:ext>
-            </a:extLst>
-          </p:cNvPr>
-          <p:cNvSpPr/>
-          <p:nvPr/>
-        </p:nvSpPr>
-        <p:spPr>
-          <a:xfrm>
-            <a:off x="10021150" y="2450889"/>
-            <a:ext cx="1708829" cy="423145"/>
-          </a:xfrm>
-          <a:prstGeom prst="rect">
-            <a:avLst/>
-          </a:prstGeom>
-          <a:ln>
-            <a:noFill/>
-          </a:ln>
-        </p:spPr>
-        <p:style>
-          <a:lnRef idx="2">
-            <a:schemeClr val="accent1">
-              <a:shade val="50000"/>
-            </a:schemeClr>
-          </a:lnRef>
-          <a:fillRef idx="1">
-            <a:schemeClr val="accent1"/>
-          </a:fillRef>
-          <a:effectRef idx="0">
-            <a:schemeClr val="accent1"/>
-          </a:effectRef>
-          <a:fontRef idx="minor">
-            <a:schemeClr val="lt1"/>
-          </a:fontRef>
-        </p:style>
-        <p:txBody>
-          <a:bodyPr rtlCol="0" anchor="ctr"/>
-          <a:lstStyle/>
-          <a:p>
-            <a:pPr algn="ctr"/>
-            <a:r>
-              <a:rPr kumimoji="1" lang="en-US" sz="1500" dirty="0"/>
-              <a:t>Network</a:t>
-            </a:r>
-            <a:endParaRPr kumimoji="1" lang="en-JP" sz="1500" dirty="0"/>
-          </a:p>
-        </p:txBody>
-      </p:sp>
-      <p:cxnSp>
-        <p:nvCxnSpPr>
-          <p:cNvPr id="18" name="Straight Arrow Connector 17">
-            <a:extLst>
-              <a:ext uri="{FF2B5EF4-FFF2-40B4-BE49-F238E27FC236}">
-                <a16:creationId xmlns:a16="http://schemas.microsoft.com/office/drawing/2014/main" id="{D875ECD4-9093-31DB-FF0F-B46B31F0E8D9}"/>
-              </a:ext>
-            </a:extLst>
-          </p:cNvPr>
-          <p:cNvCxnSpPr>
-            <a:cxnSpLocks/>
-          </p:cNvCxnSpPr>
-          <p:nvPr/>
-        </p:nvCxnSpPr>
-        <p:spPr>
-          <a:xfrm>
-            <a:off x="914963" y="2597624"/>
-            <a:ext cx="0" cy="450319"/>
-          </a:xfrm>
-          <a:prstGeom prst="straightConnector1">
-            <a:avLst/>
-          </a:prstGeom>
-          <a:ln w="66675">
-            <a:solidFill>
-              <a:schemeClr val="accent6">
-                <a:lumMod val="50000"/>
-              </a:schemeClr>
-            </a:solidFill>
-            <a:tailEnd type="triangle"/>
-          </a:ln>
-        </p:spPr>
-        <p:style>
-          <a:lnRef idx="1">
-            <a:schemeClr val="accent1"/>
-          </a:lnRef>
-          <a:fillRef idx="0">
-            <a:schemeClr val="accent1"/>
-          </a:fillRef>
-          <a:effectRef idx="0">
-            <a:schemeClr val="accent1"/>
-          </a:effectRef>
-          <a:fontRef idx="minor">
-            <a:schemeClr val="tx1"/>
-          </a:fontRef>
-        </p:style>
-      </p:cxnSp>
-      <p:cxnSp>
-        <p:nvCxnSpPr>
-          <p:cNvPr id="19" name="Straight Arrow Connector 18">
-            <a:extLst>
-              <a:ext uri="{FF2B5EF4-FFF2-40B4-BE49-F238E27FC236}">
-                <a16:creationId xmlns:a16="http://schemas.microsoft.com/office/drawing/2014/main" id="{BECBCFD1-4D84-FC46-21FB-755BC9A706C4}"/>
-              </a:ext>
-            </a:extLst>
-          </p:cNvPr>
-          <p:cNvCxnSpPr>
-            <a:cxnSpLocks/>
-          </p:cNvCxnSpPr>
-          <p:nvPr/>
-        </p:nvCxnSpPr>
-        <p:spPr>
-          <a:xfrm>
-            <a:off x="2790987" y="2597622"/>
-            <a:ext cx="0" cy="450319"/>
-          </a:xfrm>
-          <a:prstGeom prst="straightConnector1">
-            <a:avLst/>
-          </a:prstGeom>
-          <a:ln w="66675">
-            <a:solidFill>
-              <a:schemeClr val="accent6">
-                <a:lumMod val="50000"/>
-              </a:schemeClr>
-            </a:solidFill>
-            <a:tailEnd type="triangle"/>
-          </a:ln>
-        </p:spPr>
-        <p:style>
-          <a:lnRef idx="1">
-            <a:schemeClr val="accent1"/>
-          </a:lnRef>
-          <a:fillRef idx="0">
-            <a:schemeClr val="accent1"/>
-          </a:fillRef>
-          <a:effectRef idx="0">
-            <a:schemeClr val="accent1"/>
-          </a:effectRef>
-          <a:fontRef idx="minor">
-            <a:schemeClr val="tx1"/>
-          </a:fontRef>
-        </p:style>
-      </p:cxnSp>
-      <p:sp>
-        <p:nvSpPr>
-          <p:cNvPr id="20" name="TextBox 19">
-            <a:extLst>
-              <a:ext uri="{FF2B5EF4-FFF2-40B4-BE49-F238E27FC236}">
-                <a16:creationId xmlns:a16="http://schemas.microsoft.com/office/drawing/2014/main" id="{E23E0997-73DE-2A94-0B10-9CBF2E24AF50}"/>
-              </a:ext>
-            </a:extLst>
-          </p:cNvPr>
-          <p:cNvSpPr txBox="1"/>
-          <p:nvPr/>
-        </p:nvSpPr>
-        <p:spPr>
-          <a:xfrm>
-            <a:off x="363545" y="3393290"/>
-            <a:ext cx="1395939" cy="307777"/>
-          </a:xfrm>
-          <a:prstGeom prst="rect">
-            <a:avLst/>
-          </a:prstGeom>
-          <a:noFill/>
-        </p:spPr>
-        <p:txBody>
-          <a:bodyPr wrap="square" rtlCol="0">
-            <a:spAutoFit/>
-          </a:bodyPr>
-          <a:lstStyle/>
-          <a:p>
-            <a:r>
-              <a:rPr lang="en-US" sz="1400" i="1" u="sng" dirty="0" err="1"/>
-              <a:t>UI、Transition</a:t>
-            </a:r>
-            <a:endParaRPr kumimoji="1" lang="en-JP" sz="1400" i="1" u="sng" dirty="0"/>
-          </a:p>
-        </p:txBody>
-      </p:sp>
-      <p:sp>
-        <p:nvSpPr>
-          <p:cNvPr id="21" name="TextBox 20">
-            <a:extLst>
-              <a:ext uri="{FF2B5EF4-FFF2-40B4-BE49-F238E27FC236}">
-                <a16:creationId xmlns:a16="http://schemas.microsoft.com/office/drawing/2014/main" id="{85EACEF8-74A5-E5AA-F164-E6F7B58941A4}"/>
-              </a:ext>
-            </a:extLst>
-          </p:cNvPr>
-          <p:cNvSpPr txBox="1"/>
-          <p:nvPr/>
-        </p:nvSpPr>
-        <p:spPr>
-          <a:xfrm>
-            <a:off x="2353748" y="3348720"/>
-            <a:ext cx="1128145" cy="307777"/>
-          </a:xfrm>
-          <a:prstGeom prst="rect">
-            <a:avLst/>
-          </a:prstGeom>
-          <a:noFill/>
-        </p:spPr>
-        <p:txBody>
-          <a:bodyPr wrap="square" rtlCol="0">
-            <a:spAutoFit/>
-          </a:bodyPr>
-          <a:lstStyle/>
-          <a:p>
-            <a:r>
-              <a:rPr kumimoji="1" lang="en-US" sz="1400" i="1" u="sng" dirty="0"/>
-              <a:t>UI binding</a:t>
-            </a:r>
-            <a:endParaRPr kumimoji="1" lang="en-JP" sz="1400" i="1" u="sng" dirty="0"/>
-          </a:p>
-        </p:txBody>
-      </p:sp>
-      <p:cxnSp>
-        <p:nvCxnSpPr>
-          <p:cNvPr id="22" name="Straight Arrow Connector 21">
-            <a:extLst>
-              <a:ext uri="{FF2B5EF4-FFF2-40B4-BE49-F238E27FC236}">
-                <a16:creationId xmlns:a16="http://schemas.microsoft.com/office/drawing/2014/main" id="{002CC68D-3D7F-39DB-CE9A-835E5975B121}"/>
-              </a:ext>
-            </a:extLst>
-          </p:cNvPr>
-          <p:cNvCxnSpPr>
-            <a:cxnSpLocks/>
-          </p:cNvCxnSpPr>
-          <p:nvPr/>
-        </p:nvCxnSpPr>
-        <p:spPr>
-          <a:xfrm>
-            <a:off x="4651484" y="2597623"/>
-            <a:ext cx="0" cy="450319"/>
-          </a:xfrm>
-          <a:prstGeom prst="straightConnector1">
-            <a:avLst/>
-          </a:prstGeom>
-          <a:ln w="66675">
-            <a:solidFill>
-              <a:schemeClr val="accent6">
-                <a:lumMod val="50000"/>
-              </a:schemeClr>
-            </a:solidFill>
-            <a:tailEnd type="triangle"/>
-          </a:ln>
-        </p:spPr>
-        <p:style>
-          <a:lnRef idx="1">
-            <a:schemeClr val="accent1"/>
-          </a:lnRef>
-          <a:fillRef idx="0">
-            <a:schemeClr val="accent1"/>
-          </a:fillRef>
-          <a:effectRef idx="0">
-            <a:schemeClr val="accent1"/>
-          </a:effectRef>
-          <a:fontRef idx="minor">
-            <a:schemeClr val="tx1"/>
-          </a:fontRef>
-        </p:style>
-      </p:cxnSp>
-      <p:sp>
-        <p:nvSpPr>
-          <p:cNvPr id="23" name="TextBox 22">
-            <a:extLst>
-              <a:ext uri="{FF2B5EF4-FFF2-40B4-BE49-F238E27FC236}">
-                <a16:creationId xmlns:a16="http://schemas.microsoft.com/office/drawing/2014/main" id="{94B76862-3AAF-5813-79F3-1B2337357958}"/>
-              </a:ext>
-            </a:extLst>
-          </p:cNvPr>
-          <p:cNvSpPr txBox="1"/>
-          <p:nvPr/>
-        </p:nvSpPr>
-        <p:spPr>
-          <a:xfrm>
-            <a:off x="3983109" y="3332792"/>
-            <a:ext cx="1382235" cy="523220"/>
-          </a:xfrm>
-          <a:prstGeom prst="rect">
-            <a:avLst/>
-          </a:prstGeom>
-          <a:noFill/>
-        </p:spPr>
-        <p:txBody>
-          <a:bodyPr wrap="square" rtlCol="0">
-            <a:spAutoFit/>
-          </a:bodyPr>
-          <a:lstStyle/>
-          <a:p>
-            <a:r>
-              <a:rPr kumimoji="1" lang="en-US" sz="1400" i="1" u="sng" dirty="0"/>
-              <a:t>Business logic</a:t>
-            </a:r>
-          </a:p>
-          <a:p>
-            <a:pPr algn="ctr"/>
-            <a:r>
-              <a:rPr lang="en-US" sz="1400" b="1" u="sng" dirty="0"/>
-              <a:t>( Optional )</a:t>
-            </a:r>
-            <a:endParaRPr kumimoji="1" lang="en-JP" sz="1400" b="1" u="sng" dirty="0"/>
-          </a:p>
-        </p:txBody>
-      </p:sp>
-      <p:sp>
-        <p:nvSpPr>
-          <p:cNvPr id="24" name="TextBox 23">
-            <a:extLst>
-              <a:ext uri="{FF2B5EF4-FFF2-40B4-BE49-F238E27FC236}">
-                <a16:creationId xmlns:a16="http://schemas.microsoft.com/office/drawing/2014/main" id="{7E6A0028-7104-A9A0-ABF8-DA0A965842A1}"/>
-              </a:ext>
-            </a:extLst>
-          </p:cNvPr>
-          <p:cNvSpPr txBox="1"/>
-          <p:nvPr/>
-        </p:nvSpPr>
-        <p:spPr>
-          <a:xfrm>
-            <a:off x="5857652" y="3332794"/>
-            <a:ext cx="1302399" cy="307777"/>
-          </a:xfrm>
-          <a:prstGeom prst="rect">
-            <a:avLst/>
-          </a:prstGeom>
-          <a:noFill/>
-        </p:spPr>
-        <p:txBody>
-          <a:bodyPr wrap="square" rtlCol="0">
-            <a:spAutoFit/>
-          </a:bodyPr>
-          <a:lstStyle/>
-          <a:p>
-            <a:r>
-              <a:rPr lang="en-US" sz="1400" i="1" u="sng" dirty="0"/>
-              <a:t>Scenario flow</a:t>
-            </a:r>
-            <a:endParaRPr kumimoji="1" lang="en-JP" sz="1400" i="1" u="sng" dirty="0"/>
-          </a:p>
-        </p:txBody>
-      </p:sp>
-      <p:cxnSp>
-        <p:nvCxnSpPr>
-          <p:cNvPr id="25" name="Straight Arrow Connector 24">
-            <a:extLst>
-              <a:ext uri="{FF2B5EF4-FFF2-40B4-BE49-F238E27FC236}">
-                <a16:creationId xmlns:a16="http://schemas.microsoft.com/office/drawing/2014/main" id="{C162DB3C-62A9-6C2C-C521-29D131A13EC0}"/>
-              </a:ext>
-            </a:extLst>
-          </p:cNvPr>
-          <p:cNvCxnSpPr>
-            <a:cxnSpLocks/>
-          </p:cNvCxnSpPr>
-          <p:nvPr/>
-        </p:nvCxnSpPr>
-        <p:spPr>
-          <a:xfrm>
-            <a:off x="6439225" y="2597624"/>
-            <a:ext cx="0" cy="450319"/>
-          </a:xfrm>
-          <a:prstGeom prst="straightConnector1">
-            <a:avLst/>
-          </a:prstGeom>
-          <a:ln w="66675">
-            <a:solidFill>
-              <a:schemeClr val="accent6">
-                <a:lumMod val="50000"/>
-              </a:schemeClr>
-            </a:solidFill>
-            <a:tailEnd type="triangle"/>
-          </a:ln>
-        </p:spPr>
-        <p:style>
-          <a:lnRef idx="1">
-            <a:schemeClr val="accent1"/>
-          </a:lnRef>
-          <a:fillRef idx="0">
-            <a:schemeClr val="accent1"/>
-          </a:fillRef>
-          <a:effectRef idx="0">
-            <a:schemeClr val="accent1"/>
-          </a:effectRef>
-          <a:fontRef idx="minor">
-            <a:schemeClr val="tx1"/>
-          </a:fontRef>
-        </p:style>
-      </p:cxnSp>
-      <p:cxnSp>
-        <p:nvCxnSpPr>
-          <p:cNvPr id="26" name="Straight Arrow Connector 25">
-            <a:extLst>
-              <a:ext uri="{FF2B5EF4-FFF2-40B4-BE49-F238E27FC236}">
-                <a16:creationId xmlns:a16="http://schemas.microsoft.com/office/drawing/2014/main" id="{1F9E8D08-15A7-167D-4136-3AD74FF952F7}"/>
-              </a:ext>
-            </a:extLst>
-          </p:cNvPr>
-          <p:cNvCxnSpPr>
-            <a:cxnSpLocks/>
-          </p:cNvCxnSpPr>
-          <p:nvPr/>
-        </p:nvCxnSpPr>
-        <p:spPr>
-          <a:xfrm>
-            <a:off x="8393736" y="2565546"/>
-            <a:ext cx="0" cy="450319"/>
-          </a:xfrm>
-          <a:prstGeom prst="straightConnector1">
-            <a:avLst/>
-          </a:prstGeom>
-          <a:ln w="66675">
-            <a:solidFill>
-              <a:schemeClr val="accent6">
-                <a:lumMod val="50000"/>
-              </a:schemeClr>
-            </a:solidFill>
-            <a:tailEnd type="triangle"/>
-          </a:ln>
-        </p:spPr>
-        <p:style>
-          <a:lnRef idx="1">
-            <a:schemeClr val="accent1"/>
-          </a:lnRef>
-          <a:fillRef idx="0">
-            <a:schemeClr val="accent1"/>
-          </a:fillRef>
-          <a:effectRef idx="0">
-            <a:schemeClr val="accent1"/>
-          </a:effectRef>
-          <a:fontRef idx="minor">
-            <a:schemeClr val="tx1"/>
-          </a:fontRef>
-        </p:style>
-      </p:cxnSp>
-      <p:sp>
-        <p:nvSpPr>
-          <p:cNvPr id="28" name="TextBox 27">
-            <a:extLst>
-              <a:ext uri="{FF2B5EF4-FFF2-40B4-BE49-F238E27FC236}">
-                <a16:creationId xmlns:a16="http://schemas.microsoft.com/office/drawing/2014/main" id="{92DB1683-18F5-CC4A-94C9-A9ADE63B2673}"/>
-              </a:ext>
-            </a:extLst>
-          </p:cNvPr>
-          <p:cNvSpPr txBox="1"/>
-          <p:nvPr/>
-        </p:nvSpPr>
-        <p:spPr>
-          <a:xfrm>
-            <a:off x="7588964" y="3332793"/>
-            <a:ext cx="1820373" cy="307777"/>
-          </a:xfrm>
-          <a:prstGeom prst="rect">
-            <a:avLst/>
-          </a:prstGeom>
-          <a:noFill/>
-        </p:spPr>
-        <p:txBody>
-          <a:bodyPr wrap="square" rtlCol="0">
-            <a:spAutoFit/>
-          </a:bodyPr>
-          <a:lstStyle/>
-          <a:p>
-            <a:r>
-              <a:rPr lang="en-US" sz="1400" i="1" u="sng" dirty="0"/>
-              <a:t>Feature data object</a:t>
-            </a:r>
-            <a:endParaRPr kumimoji="1" lang="en-JP" sz="1400" i="1" u="sng" dirty="0"/>
-          </a:p>
-        </p:txBody>
-      </p:sp>
-      <p:sp>
-        <p:nvSpPr>
-          <p:cNvPr id="29" name="正方形/長方形 34">
-            <a:extLst>
-              <a:ext uri="{FF2B5EF4-FFF2-40B4-BE49-F238E27FC236}">
-                <a16:creationId xmlns:a16="http://schemas.microsoft.com/office/drawing/2014/main" id="{C9F4F6CD-6A14-5140-E3EB-5A605C29FF49}"/>
-              </a:ext>
-            </a:extLst>
-          </p:cNvPr>
-          <p:cNvSpPr/>
-          <p:nvPr/>
-        </p:nvSpPr>
-        <p:spPr>
-          <a:xfrm>
-            <a:off x="1971220" y="4470054"/>
-            <a:ext cx="2029065" cy="423145"/>
-          </a:xfrm>
-          <a:prstGeom prst="rect">
-            <a:avLst/>
-          </a:prstGeom>
-          <a:solidFill>
-            <a:schemeClr val="accent4">
-              <a:lumMod val="50000"/>
-            </a:schemeClr>
-          </a:solidFill>
-          <a:ln>
-            <a:noFill/>
-          </a:ln>
-        </p:spPr>
-        <p:style>
-          <a:lnRef idx="2">
-            <a:schemeClr val="accent1">
-              <a:shade val="50000"/>
-            </a:schemeClr>
-          </a:lnRef>
-          <a:fillRef idx="1">
-            <a:schemeClr val="accent1"/>
-          </a:fillRef>
-          <a:effectRef idx="0">
-            <a:schemeClr val="accent1"/>
-          </a:effectRef>
-          <a:fontRef idx="minor">
-            <a:schemeClr val="lt1"/>
-          </a:fontRef>
-        </p:style>
-        <p:txBody>
-          <a:bodyPr rtlCol="0" anchor="ctr"/>
-          <a:lstStyle/>
-          <a:p>
-            <a:pPr algn="ctr"/>
-            <a:r>
-              <a:rPr kumimoji="1" lang="en-US" sz="1300" b="1" dirty="0">
-                <a:solidFill>
-                  <a:schemeClr val="bg1"/>
-                </a:solidFill>
-              </a:rPr>
-              <a:t>DTO </a:t>
-            </a:r>
-          </a:p>
-          <a:p>
-            <a:pPr algn="ctr"/>
-            <a:r>
-              <a:rPr lang="en-US" sz="1300" b="1" dirty="0">
-                <a:solidFill>
-                  <a:schemeClr val="bg1"/>
-                </a:solidFill>
-              </a:rPr>
-              <a:t>(Data Transfer Object )</a:t>
-            </a:r>
-            <a:endParaRPr kumimoji="1" lang="en-US" sz="1300" b="1" dirty="0">
-              <a:solidFill>
-                <a:schemeClr val="bg1"/>
-              </a:solidFill>
-            </a:endParaRPr>
-          </a:p>
-        </p:txBody>
-      </p:sp>
-      <p:cxnSp>
-        <p:nvCxnSpPr>
-          <p:cNvPr id="30" name="Straight Arrow Connector 29">
-            <a:extLst>
-              <a:ext uri="{FF2B5EF4-FFF2-40B4-BE49-F238E27FC236}">
-                <a16:creationId xmlns:a16="http://schemas.microsoft.com/office/drawing/2014/main" id="{4214A000-CB49-6383-2D61-CCB6E7A6357C}"/>
-              </a:ext>
-            </a:extLst>
-          </p:cNvPr>
-          <p:cNvCxnSpPr>
-            <a:cxnSpLocks/>
-          </p:cNvCxnSpPr>
-          <p:nvPr/>
-        </p:nvCxnSpPr>
-        <p:spPr>
-          <a:xfrm>
-            <a:off x="945999" y="5209444"/>
-            <a:ext cx="0" cy="450319"/>
-          </a:xfrm>
-          <a:prstGeom prst="straightConnector1">
-            <a:avLst/>
-          </a:prstGeom>
-          <a:ln w="66675">
-            <a:solidFill>
-              <a:schemeClr val="accent6">
-                <a:lumMod val="50000"/>
-              </a:schemeClr>
-            </a:solidFill>
-            <a:tailEnd type="triangle"/>
-          </a:ln>
-        </p:spPr>
-        <p:style>
-          <a:lnRef idx="1">
-            <a:schemeClr val="accent1"/>
-          </a:lnRef>
-          <a:fillRef idx="0">
-            <a:schemeClr val="accent1"/>
-          </a:fillRef>
-          <a:effectRef idx="0">
-            <a:schemeClr val="accent1"/>
-          </a:effectRef>
-          <a:fontRef idx="minor">
-            <a:schemeClr val="tx1"/>
-          </a:fontRef>
-        </p:style>
-      </p:cxnSp>
-      <p:cxnSp>
-        <p:nvCxnSpPr>
-          <p:cNvPr id="31" name="Straight Arrow Connector 30">
-            <a:extLst>
-              <a:ext uri="{FF2B5EF4-FFF2-40B4-BE49-F238E27FC236}">
-                <a16:creationId xmlns:a16="http://schemas.microsoft.com/office/drawing/2014/main" id="{1529E91D-995B-45D3-FF7D-52DB894AF036}"/>
-              </a:ext>
-            </a:extLst>
-          </p:cNvPr>
-          <p:cNvCxnSpPr>
-            <a:cxnSpLocks/>
-          </p:cNvCxnSpPr>
-          <p:nvPr/>
-        </p:nvCxnSpPr>
-        <p:spPr>
-          <a:xfrm>
-            <a:off x="2917820" y="5209443"/>
-            <a:ext cx="0" cy="450319"/>
-          </a:xfrm>
-          <a:prstGeom prst="straightConnector1">
-            <a:avLst/>
-          </a:prstGeom>
-          <a:ln w="66675">
-            <a:solidFill>
-              <a:schemeClr val="accent6">
-                <a:lumMod val="50000"/>
-              </a:schemeClr>
-            </a:solidFill>
-            <a:tailEnd type="triangle"/>
-          </a:ln>
-        </p:spPr>
-        <p:style>
-          <a:lnRef idx="1">
-            <a:schemeClr val="accent1"/>
-          </a:lnRef>
-          <a:fillRef idx="0">
-            <a:schemeClr val="accent1"/>
-          </a:fillRef>
-          <a:effectRef idx="0">
-            <a:schemeClr val="accent1"/>
-          </a:effectRef>
-          <a:fontRef idx="minor">
-            <a:schemeClr val="tx1"/>
-          </a:fontRef>
-        </p:style>
-      </p:cxnSp>
-      <p:sp>
-        <p:nvSpPr>
-          <p:cNvPr id="32" name="TextBox 31">
-            <a:extLst>
-              <a:ext uri="{FF2B5EF4-FFF2-40B4-BE49-F238E27FC236}">
-                <a16:creationId xmlns:a16="http://schemas.microsoft.com/office/drawing/2014/main" id="{F6103397-A0D3-6C66-DA79-E91CE697AC52}"/>
-              </a:ext>
-            </a:extLst>
-          </p:cNvPr>
-          <p:cNvSpPr txBox="1"/>
-          <p:nvPr/>
-        </p:nvSpPr>
-        <p:spPr>
-          <a:xfrm>
-            <a:off x="415322" y="5822572"/>
-            <a:ext cx="1195093" cy="307777"/>
-          </a:xfrm>
-          <a:prstGeom prst="rect">
-            <a:avLst/>
-          </a:prstGeom>
-          <a:noFill/>
-        </p:spPr>
-        <p:txBody>
-          <a:bodyPr wrap="square" rtlCol="0">
-            <a:spAutoFit/>
-          </a:bodyPr>
-          <a:lstStyle/>
-          <a:p>
-            <a:r>
-              <a:rPr lang="en-US" sz="1400" i="1" u="sng" dirty="0"/>
-              <a:t>Data source</a:t>
-            </a:r>
-            <a:endParaRPr kumimoji="1" lang="en-JP" sz="1400" i="1" u="sng" dirty="0"/>
-          </a:p>
-        </p:txBody>
-      </p:sp>
-      <p:sp>
-        <p:nvSpPr>
-          <p:cNvPr id="33" name="TextBox 32">
-            <a:extLst>
-              <a:ext uri="{FF2B5EF4-FFF2-40B4-BE49-F238E27FC236}">
-                <a16:creationId xmlns:a16="http://schemas.microsoft.com/office/drawing/2014/main" id="{61378229-DA25-1038-3815-CE3261C3FD8F}"/>
-              </a:ext>
-            </a:extLst>
-          </p:cNvPr>
-          <p:cNvSpPr txBox="1"/>
-          <p:nvPr/>
-        </p:nvSpPr>
-        <p:spPr>
-          <a:xfrm>
-            <a:off x="2129504" y="5822117"/>
-            <a:ext cx="1712496" cy="307777"/>
-          </a:xfrm>
-          <a:prstGeom prst="rect">
-            <a:avLst/>
-          </a:prstGeom>
-          <a:noFill/>
-        </p:spPr>
-        <p:txBody>
-          <a:bodyPr wrap="square" rtlCol="0">
-            <a:spAutoFit/>
-          </a:bodyPr>
-          <a:lstStyle/>
-          <a:p>
-            <a:r>
-              <a:rPr lang="en-US" sz="1400" i="1" u="sng" dirty="0"/>
-              <a:t>Convert response</a:t>
-            </a:r>
-            <a:endParaRPr kumimoji="1" lang="en-JP" sz="1400" i="1" u="sng" dirty="0"/>
+            <a:endParaRPr kumimoji="1" lang="en-JP" dirty="0"/>
           </a:p>
         </p:txBody>
       </p:sp>
     </p:spTree>
     <p:extLst>
       <p:ext uri="{BB962C8B-B14F-4D97-AF65-F5344CB8AC3E}">
-        <p14:creationId xmlns:p14="http://schemas.microsoft.com/office/powerpoint/2010/main" val="3064127956"/>
+        <p14:creationId xmlns:p14="http://schemas.microsoft.com/office/powerpoint/2010/main" val="1025249058"/>
       </p:ext>
     </p:extLst>
   </p:cSld>
@@ -5933,6 +5265,2692 @@
             <a:pPr algn="ctr"/>
             <a:r>
               <a:rPr lang="en-JP" altLang="ja-JP" sz="3600" b="1" kern="0" dirty="0"/>
+              <a:t>Sep</a:t>
+            </a:r>
+            <a:r>
+              <a:rPr lang="en-US" altLang="ja-JP" sz="3600" b="1" kern="0" dirty="0"/>
+              <a:t>a</a:t>
+            </a:r>
+            <a:r>
+              <a:rPr lang="en-JP" altLang="ja-JP" sz="3600" b="1" kern="0" dirty="0"/>
+              <a:t>rate usecase into modules</a:t>
+            </a:r>
+            <a:endParaRPr lang="ja-JP" altLang="en-US" sz="3600" b="1" kern="0" dirty="0"/>
+          </a:p>
+        </p:txBody>
+      </p:sp>
+      <p:cxnSp>
+        <p:nvCxnSpPr>
+          <p:cNvPr id="8" name="Straight Connector 7">
+            <a:extLst>
+              <a:ext uri="{FF2B5EF4-FFF2-40B4-BE49-F238E27FC236}">
+                <a16:creationId xmlns:a16="http://schemas.microsoft.com/office/drawing/2014/main" id="{0F07A22E-5A49-9049-9297-0D650C8F1F64}"/>
+              </a:ext>
+            </a:extLst>
+          </p:cNvPr>
+          <p:cNvCxnSpPr>
+            <a:cxnSpLocks/>
+          </p:cNvCxnSpPr>
+          <p:nvPr/>
+        </p:nvCxnSpPr>
+        <p:spPr>
+          <a:xfrm>
+            <a:off x="797441" y="950071"/>
+            <a:ext cx="10047768" cy="0"/>
+          </a:xfrm>
+          <a:prstGeom prst="line">
+            <a:avLst/>
+          </a:prstGeom>
+          <a:ln/>
+        </p:spPr>
+        <p:style>
+          <a:lnRef idx="2">
+            <a:schemeClr val="dk1"/>
+          </a:lnRef>
+          <a:fillRef idx="0">
+            <a:schemeClr val="dk1"/>
+          </a:fillRef>
+          <a:effectRef idx="1">
+            <a:schemeClr val="dk1"/>
+          </a:effectRef>
+          <a:fontRef idx="minor">
+            <a:schemeClr val="tx1"/>
+          </a:fontRef>
+        </p:style>
+      </p:cxnSp>
+      <p:sp>
+        <p:nvSpPr>
+          <p:cNvPr id="3" name="正方形/長方形 34">
+            <a:extLst>
+              <a:ext uri="{FF2B5EF4-FFF2-40B4-BE49-F238E27FC236}">
+                <a16:creationId xmlns:a16="http://schemas.microsoft.com/office/drawing/2014/main" id="{A7187707-2915-2D5A-202D-E35793A539E5}"/>
+              </a:ext>
+            </a:extLst>
+          </p:cNvPr>
+          <p:cNvSpPr/>
+          <p:nvPr/>
+        </p:nvSpPr>
+        <p:spPr>
+          <a:xfrm>
+            <a:off x="244821" y="1690632"/>
+            <a:ext cx="1365594" cy="423145"/>
+          </a:xfrm>
+          <a:prstGeom prst="rect">
+            <a:avLst/>
+          </a:prstGeom>
+          <a:solidFill>
+            <a:schemeClr val="accent6">
+              <a:lumMod val="50000"/>
+            </a:schemeClr>
+          </a:solidFill>
+          <a:ln>
+            <a:noFill/>
+          </a:ln>
+        </p:spPr>
+        <p:style>
+          <a:lnRef idx="2">
+            <a:schemeClr val="accent1">
+              <a:shade val="50000"/>
+            </a:schemeClr>
+          </a:lnRef>
+          <a:fillRef idx="1">
+            <a:schemeClr val="accent1"/>
+          </a:fillRef>
+          <a:effectRef idx="0">
+            <a:schemeClr val="accent1"/>
+          </a:effectRef>
+          <a:fontRef idx="minor">
+            <a:schemeClr val="lt1"/>
+          </a:fontRef>
+        </p:style>
+        <p:txBody>
+          <a:bodyPr rtlCol="0" anchor="ctr"/>
+          <a:lstStyle/>
+          <a:p>
+            <a:pPr algn="ctr"/>
+            <a:r>
+              <a:rPr kumimoji="1" lang="en-US" sz="1300" b="1" dirty="0" err="1">
+                <a:solidFill>
+                  <a:schemeClr val="bg1"/>
+                </a:solidFill>
+              </a:rPr>
+              <a:t>ViewController</a:t>
+            </a:r>
+            <a:endParaRPr kumimoji="1" lang="en-US" sz="1300" b="1" dirty="0">
+              <a:solidFill>
+                <a:schemeClr val="bg1"/>
+              </a:solidFill>
+            </a:endParaRPr>
+          </a:p>
+        </p:txBody>
+      </p:sp>
+      <p:sp>
+        <p:nvSpPr>
+          <p:cNvPr id="4" name="正方形/長方形 34">
+            <a:extLst>
+              <a:ext uri="{FF2B5EF4-FFF2-40B4-BE49-F238E27FC236}">
+                <a16:creationId xmlns:a16="http://schemas.microsoft.com/office/drawing/2014/main" id="{48FCBF24-58E7-9631-41C4-AF5D40DC66AD}"/>
+              </a:ext>
+            </a:extLst>
+          </p:cNvPr>
+          <p:cNvSpPr/>
+          <p:nvPr/>
+        </p:nvSpPr>
+        <p:spPr>
+          <a:xfrm>
+            <a:off x="2139788" y="1690297"/>
+            <a:ext cx="1302398" cy="423145"/>
+          </a:xfrm>
+          <a:prstGeom prst="rect">
+            <a:avLst/>
+          </a:prstGeom>
+          <a:solidFill>
+            <a:schemeClr val="accent6">
+              <a:lumMod val="50000"/>
+            </a:schemeClr>
+          </a:solidFill>
+          <a:ln>
+            <a:noFill/>
+          </a:ln>
+        </p:spPr>
+        <p:style>
+          <a:lnRef idx="2">
+            <a:schemeClr val="accent1">
+              <a:shade val="50000"/>
+            </a:schemeClr>
+          </a:lnRef>
+          <a:fillRef idx="1">
+            <a:schemeClr val="accent1"/>
+          </a:fillRef>
+          <a:effectRef idx="0">
+            <a:schemeClr val="accent1"/>
+          </a:effectRef>
+          <a:fontRef idx="minor">
+            <a:schemeClr val="lt1"/>
+          </a:fontRef>
+        </p:style>
+        <p:txBody>
+          <a:bodyPr rtlCol="0" anchor="ctr"/>
+          <a:lstStyle/>
+          <a:p>
+            <a:pPr algn="ctr"/>
+            <a:r>
+              <a:rPr kumimoji="1" lang="en-US" sz="1300" b="1" dirty="0" err="1">
+                <a:solidFill>
+                  <a:schemeClr val="bg1"/>
+                </a:solidFill>
+              </a:rPr>
+              <a:t>ViewModel</a:t>
+            </a:r>
+            <a:endParaRPr kumimoji="1" lang="en-US" sz="1300" b="1" dirty="0">
+              <a:solidFill>
+                <a:schemeClr val="bg1"/>
+              </a:solidFill>
+            </a:endParaRPr>
+          </a:p>
+        </p:txBody>
+      </p:sp>
+      <p:sp>
+        <p:nvSpPr>
+          <p:cNvPr id="5" name="正方形/長方形 34">
+            <a:extLst>
+              <a:ext uri="{FF2B5EF4-FFF2-40B4-BE49-F238E27FC236}">
+                <a16:creationId xmlns:a16="http://schemas.microsoft.com/office/drawing/2014/main" id="{F1E8CE5B-CE3A-97CD-AC99-87EE253EE6C9}"/>
+              </a:ext>
+            </a:extLst>
+          </p:cNvPr>
+          <p:cNvSpPr/>
+          <p:nvPr/>
+        </p:nvSpPr>
+        <p:spPr>
+          <a:xfrm>
+            <a:off x="5942464" y="1690296"/>
+            <a:ext cx="1302404" cy="423145"/>
+          </a:xfrm>
+          <a:prstGeom prst="rect">
+            <a:avLst/>
+          </a:prstGeom>
+          <a:solidFill>
+            <a:schemeClr val="accent2">
+              <a:lumMod val="50000"/>
+            </a:schemeClr>
+          </a:solidFill>
+          <a:ln>
+            <a:noFill/>
+          </a:ln>
+        </p:spPr>
+        <p:style>
+          <a:lnRef idx="2">
+            <a:schemeClr val="accent1">
+              <a:shade val="50000"/>
+            </a:schemeClr>
+          </a:lnRef>
+          <a:fillRef idx="1">
+            <a:schemeClr val="accent1"/>
+          </a:fillRef>
+          <a:effectRef idx="0">
+            <a:schemeClr val="accent1"/>
+          </a:effectRef>
+          <a:fontRef idx="minor">
+            <a:schemeClr val="lt1"/>
+          </a:fontRef>
+        </p:style>
+        <p:txBody>
+          <a:bodyPr rtlCol="0" anchor="ctr"/>
+          <a:lstStyle/>
+          <a:p>
+            <a:pPr algn="ctr"/>
+            <a:r>
+              <a:rPr kumimoji="1" lang="en-US" sz="1300" b="1" dirty="0" err="1">
+                <a:solidFill>
+                  <a:schemeClr val="bg1"/>
+                </a:solidFill>
+              </a:rPr>
+              <a:t>Use</a:t>
+            </a:r>
+            <a:r>
+              <a:rPr lang="en-US" sz="1300" b="1" dirty="0" err="1">
+                <a:solidFill>
+                  <a:schemeClr val="bg1"/>
+                </a:solidFill>
+              </a:rPr>
+              <a:t>Case</a:t>
+            </a:r>
+            <a:endParaRPr kumimoji="1" lang="en-US" sz="1300" b="1" dirty="0">
+              <a:solidFill>
+                <a:schemeClr val="bg1"/>
+              </a:solidFill>
+            </a:endParaRPr>
+          </a:p>
+        </p:txBody>
+      </p:sp>
+      <p:sp>
+        <p:nvSpPr>
+          <p:cNvPr id="7" name="正方形/長方形 34">
+            <a:extLst>
+              <a:ext uri="{FF2B5EF4-FFF2-40B4-BE49-F238E27FC236}">
+                <a16:creationId xmlns:a16="http://schemas.microsoft.com/office/drawing/2014/main" id="{14F20244-57BF-7C8D-C75C-BE6D1A638FA7}"/>
+              </a:ext>
+            </a:extLst>
+          </p:cNvPr>
+          <p:cNvSpPr/>
+          <p:nvPr/>
+        </p:nvSpPr>
+        <p:spPr>
+          <a:xfrm>
+            <a:off x="7784688" y="1697498"/>
+            <a:ext cx="1402364" cy="423145"/>
+          </a:xfrm>
+          <a:prstGeom prst="rect">
+            <a:avLst/>
+          </a:prstGeom>
+          <a:solidFill>
+            <a:schemeClr val="accent2">
+              <a:lumMod val="50000"/>
+            </a:schemeClr>
+          </a:solidFill>
+          <a:ln>
+            <a:noFill/>
+          </a:ln>
+        </p:spPr>
+        <p:style>
+          <a:lnRef idx="2">
+            <a:schemeClr val="accent1">
+              <a:shade val="50000"/>
+            </a:schemeClr>
+          </a:lnRef>
+          <a:fillRef idx="1">
+            <a:schemeClr val="accent1"/>
+          </a:fillRef>
+          <a:effectRef idx="0">
+            <a:schemeClr val="accent1"/>
+          </a:effectRef>
+          <a:fontRef idx="minor">
+            <a:schemeClr val="lt1"/>
+          </a:fontRef>
+        </p:style>
+        <p:txBody>
+          <a:bodyPr rtlCol="0" anchor="ctr"/>
+          <a:lstStyle/>
+          <a:p>
+            <a:pPr algn="ctr"/>
+            <a:r>
+              <a:rPr kumimoji="1" lang="en-US" sz="1300" b="1" dirty="0">
+                <a:solidFill>
+                  <a:schemeClr val="bg1"/>
+                </a:solidFill>
+              </a:rPr>
+              <a:t>Entity</a:t>
+            </a:r>
+          </a:p>
+        </p:txBody>
+      </p:sp>
+      <p:sp>
+        <p:nvSpPr>
+          <p:cNvPr id="9" name="正方形/長方形 34">
+            <a:extLst>
+              <a:ext uri="{FF2B5EF4-FFF2-40B4-BE49-F238E27FC236}">
+                <a16:creationId xmlns:a16="http://schemas.microsoft.com/office/drawing/2014/main" id="{C22802ED-6767-EFDC-DF26-A2BE37A4E294}"/>
+              </a:ext>
+            </a:extLst>
+          </p:cNvPr>
+          <p:cNvSpPr/>
+          <p:nvPr/>
+        </p:nvSpPr>
+        <p:spPr>
+          <a:xfrm>
+            <a:off x="244821" y="4486354"/>
+            <a:ext cx="1402357" cy="423145"/>
+          </a:xfrm>
+          <a:prstGeom prst="rect">
+            <a:avLst/>
+          </a:prstGeom>
+          <a:solidFill>
+            <a:schemeClr val="accent4">
+              <a:lumMod val="50000"/>
+            </a:schemeClr>
+          </a:solidFill>
+          <a:ln>
+            <a:noFill/>
+          </a:ln>
+        </p:spPr>
+        <p:style>
+          <a:lnRef idx="2">
+            <a:schemeClr val="accent1">
+              <a:shade val="50000"/>
+            </a:schemeClr>
+          </a:lnRef>
+          <a:fillRef idx="1">
+            <a:schemeClr val="accent1"/>
+          </a:fillRef>
+          <a:effectRef idx="0">
+            <a:schemeClr val="accent1"/>
+          </a:effectRef>
+          <a:fontRef idx="minor">
+            <a:schemeClr val="lt1"/>
+          </a:fontRef>
+        </p:style>
+        <p:txBody>
+          <a:bodyPr rtlCol="0" anchor="ctr"/>
+          <a:lstStyle/>
+          <a:p>
+            <a:pPr algn="ctr"/>
+            <a:r>
+              <a:rPr kumimoji="1" lang="en-US" sz="1300" b="1" dirty="0">
+                <a:solidFill>
+                  <a:schemeClr val="bg1"/>
+                </a:solidFill>
+              </a:rPr>
+              <a:t>Repository</a:t>
+            </a:r>
+          </a:p>
+        </p:txBody>
+      </p:sp>
+      <p:sp>
+        <p:nvSpPr>
+          <p:cNvPr id="10" name="正方形/長方形 34">
+            <a:extLst>
+              <a:ext uri="{FF2B5EF4-FFF2-40B4-BE49-F238E27FC236}">
+                <a16:creationId xmlns:a16="http://schemas.microsoft.com/office/drawing/2014/main" id="{1657F4C2-5745-15DE-D408-BF71FEE21B7C}"/>
+              </a:ext>
+            </a:extLst>
+          </p:cNvPr>
+          <p:cNvSpPr/>
+          <p:nvPr/>
+        </p:nvSpPr>
+        <p:spPr>
+          <a:xfrm>
+            <a:off x="4000285" y="1697498"/>
+            <a:ext cx="1302398" cy="423145"/>
+          </a:xfrm>
+          <a:prstGeom prst="rect">
+            <a:avLst/>
+          </a:prstGeom>
+          <a:solidFill>
+            <a:schemeClr val="accent2">
+              <a:lumMod val="50000"/>
+            </a:schemeClr>
+          </a:solidFill>
+          <a:ln>
+            <a:noFill/>
+          </a:ln>
+        </p:spPr>
+        <p:style>
+          <a:lnRef idx="2">
+            <a:schemeClr val="accent1">
+              <a:shade val="50000"/>
+            </a:schemeClr>
+          </a:lnRef>
+          <a:fillRef idx="1">
+            <a:schemeClr val="accent1"/>
+          </a:fillRef>
+          <a:effectRef idx="0">
+            <a:schemeClr val="accent1"/>
+          </a:effectRef>
+          <a:fontRef idx="minor">
+            <a:schemeClr val="lt1"/>
+          </a:fontRef>
+        </p:style>
+        <p:txBody>
+          <a:bodyPr rtlCol="0" anchor="ctr"/>
+          <a:lstStyle/>
+          <a:p>
+            <a:pPr algn="ctr"/>
+            <a:r>
+              <a:rPr kumimoji="1" lang="en-US" sz="1300" b="1" dirty="0">
+                <a:solidFill>
+                  <a:schemeClr val="bg1"/>
+                </a:solidFill>
+              </a:rPr>
+              <a:t>Model</a:t>
+            </a:r>
+          </a:p>
+        </p:txBody>
+      </p:sp>
+      <p:sp>
+        <p:nvSpPr>
+          <p:cNvPr id="11" name="正方形/長方形 34">
+            <a:extLst>
+              <a:ext uri="{FF2B5EF4-FFF2-40B4-BE49-F238E27FC236}">
+                <a16:creationId xmlns:a16="http://schemas.microsoft.com/office/drawing/2014/main" id="{A6FFF8C6-990F-C2BF-A0AF-DD9A30D57ED0}"/>
+              </a:ext>
+            </a:extLst>
+          </p:cNvPr>
+          <p:cNvSpPr/>
+          <p:nvPr/>
+        </p:nvSpPr>
+        <p:spPr>
+          <a:xfrm>
+            <a:off x="10000923" y="1690297"/>
+            <a:ext cx="1729056" cy="423145"/>
+          </a:xfrm>
+          <a:prstGeom prst="rect">
+            <a:avLst/>
+          </a:prstGeom>
+          <a:solidFill>
+            <a:schemeClr val="accent6">
+              <a:lumMod val="50000"/>
+            </a:schemeClr>
+          </a:solidFill>
+          <a:ln>
+            <a:noFill/>
+          </a:ln>
+        </p:spPr>
+        <p:style>
+          <a:lnRef idx="2">
+            <a:schemeClr val="accent1">
+              <a:shade val="50000"/>
+            </a:schemeClr>
+          </a:lnRef>
+          <a:fillRef idx="1">
+            <a:schemeClr val="accent1"/>
+          </a:fillRef>
+          <a:effectRef idx="0">
+            <a:schemeClr val="accent1"/>
+          </a:effectRef>
+          <a:fontRef idx="minor">
+            <a:schemeClr val="lt1"/>
+          </a:fontRef>
+        </p:style>
+        <p:txBody>
+          <a:bodyPr rtlCol="0" anchor="ctr"/>
+          <a:lstStyle/>
+          <a:p>
+            <a:pPr algn="ctr"/>
+            <a:r>
+              <a:rPr kumimoji="1" lang="en-US" sz="1300" b="1" dirty="0">
+                <a:solidFill>
+                  <a:schemeClr val="bg1"/>
+                </a:solidFill>
+              </a:rPr>
+              <a:t>Core Module</a:t>
+            </a:r>
+          </a:p>
+        </p:txBody>
+      </p:sp>
+      <p:cxnSp>
+        <p:nvCxnSpPr>
+          <p:cNvPr id="12" name="Straight Connector 11">
+            <a:extLst>
+              <a:ext uri="{FF2B5EF4-FFF2-40B4-BE49-F238E27FC236}">
+                <a16:creationId xmlns:a16="http://schemas.microsoft.com/office/drawing/2014/main" id="{4317C956-603C-369F-D5BB-CA037E01FCFD}"/>
+              </a:ext>
+            </a:extLst>
+          </p:cNvPr>
+          <p:cNvCxnSpPr>
+            <a:cxnSpLocks/>
+          </p:cNvCxnSpPr>
+          <p:nvPr/>
+        </p:nvCxnSpPr>
+        <p:spPr>
+          <a:xfrm>
+            <a:off x="9838251" y="1258452"/>
+            <a:ext cx="0" cy="5054940"/>
+          </a:xfrm>
+          <a:prstGeom prst="line">
+            <a:avLst/>
+          </a:prstGeom>
+          <a:ln>
+            <a:prstDash val="sysDash"/>
+          </a:ln>
+        </p:spPr>
+        <p:style>
+          <a:lnRef idx="2">
+            <a:schemeClr val="dk1"/>
+          </a:lnRef>
+          <a:fillRef idx="0">
+            <a:schemeClr val="dk1"/>
+          </a:fillRef>
+          <a:effectRef idx="1">
+            <a:schemeClr val="dk1"/>
+          </a:effectRef>
+          <a:fontRef idx="minor">
+            <a:schemeClr val="tx1"/>
+          </a:fontRef>
+        </p:style>
+      </p:cxnSp>
+      <p:sp>
+        <p:nvSpPr>
+          <p:cNvPr id="16" name="Rectangle 15">
+            <a:extLst>
+              <a:ext uri="{FF2B5EF4-FFF2-40B4-BE49-F238E27FC236}">
+                <a16:creationId xmlns:a16="http://schemas.microsoft.com/office/drawing/2014/main" id="{03E4145C-6752-EC64-D865-C92B5AC9DAFA}"/>
+              </a:ext>
+            </a:extLst>
+          </p:cNvPr>
+          <p:cNvSpPr/>
+          <p:nvPr/>
+        </p:nvSpPr>
+        <p:spPr>
+          <a:xfrm>
+            <a:off x="10000923" y="3217427"/>
+            <a:ext cx="1708814" cy="423145"/>
+          </a:xfrm>
+          <a:prstGeom prst="rect">
+            <a:avLst/>
+          </a:prstGeom>
+          <a:ln>
+            <a:noFill/>
+          </a:ln>
+        </p:spPr>
+        <p:style>
+          <a:lnRef idx="2">
+            <a:schemeClr val="accent1">
+              <a:shade val="50000"/>
+            </a:schemeClr>
+          </a:lnRef>
+          <a:fillRef idx="1">
+            <a:schemeClr val="accent1"/>
+          </a:fillRef>
+          <a:effectRef idx="0">
+            <a:schemeClr val="accent1"/>
+          </a:effectRef>
+          <a:fontRef idx="minor">
+            <a:schemeClr val="lt1"/>
+          </a:fontRef>
+        </p:style>
+        <p:txBody>
+          <a:bodyPr rtlCol="0" anchor="ctr"/>
+          <a:lstStyle/>
+          <a:p>
+            <a:pPr algn="ctr"/>
+            <a:r>
+              <a:rPr kumimoji="1" lang="en-US" sz="1500" dirty="0"/>
+              <a:t>Local persistent</a:t>
+            </a:r>
+            <a:endParaRPr kumimoji="1" lang="en-JP" sz="1500" dirty="0"/>
+          </a:p>
+        </p:txBody>
+      </p:sp>
+      <p:sp>
+        <p:nvSpPr>
+          <p:cNvPr id="17" name="Rectangle 16">
+            <a:extLst>
+              <a:ext uri="{FF2B5EF4-FFF2-40B4-BE49-F238E27FC236}">
+                <a16:creationId xmlns:a16="http://schemas.microsoft.com/office/drawing/2014/main" id="{81FE434C-EEE3-DEC6-ABB8-1CC7971211F9}"/>
+              </a:ext>
+            </a:extLst>
+          </p:cNvPr>
+          <p:cNvSpPr/>
+          <p:nvPr/>
+        </p:nvSpPr>
+        <p:spPr>
+          <a:xfrm>
+            <a:off x="10021150" y="2450889"/>
+            <a:ext cx="1708829" cy="423145"/>
+          </a:xfrm>
+          <a:prstGeom prst="rect">
+            <a:avLst/>
+          </a:prstGeom>
+          <a:ln>
+            <a:noFill/>
+          </a:ln>
+        </p:spPr>
+        <p:style>
+          <a:lnRef idx="2">
+            <a:schemeClr val="accent1">
+              <a:shade val="50000"/>
+            </a:schemeClr>
+          </a:lnRef>
+          <a:fillRef idx="1">
+            <a:schemeClr val="accent1"/>
+          </a:fillRef>
+          <a:effectRef idx="0">
+            <a:schemeClr val="accent1"/>
+          </a:effectRef>
+          <a:fontRef idx="minor">
+            <a:schemeClr val="lt1"/>
+          </a:fontRef>
+        </p:style>
+        <p:txBody>
+          <a:bodyPr rtlCol="0" anchor="ctr"/>
+          <a:lstStyle/>
+          <a:p>
+            <a:pPr algn="ctr"/>
+            <a:r>
+              <a:rPr kumimoji="1" lang="en-US" sz="1500" dirty="0"/>
+              <a:t>Network</a:t>
+            </a:r>
+            <a:endParaRPr kumimoji="1" lang="en-JP" sz="1500" dirty="0"/>
+          </a:p>
+        </p:txBody>
+      </p:sp>
+      <p:cxnSp>
+        <p:nvCxnSpPr>
+          <p:cNvPr id="18" name="Straight Arrow Connector 17">
+            <a:extLst>
+              <a:ext uri="{FF2B5EF4-FFF2-40B4-BE49-F238E27FC236}">
+                <a16:creationId xmlns:a16="http://schemas.microsoft.com/office/drawing/2014/main" id="{D875ECD4-9093-31DB-FF0F-B46B31F0E8D9}"/>
+              </a:ext>
+            </a:extLst>
+          </p:cNvPr>
+          <p:cNvCxnSpPr>
+            <a:cxnSpLocks/>
+          </p:cNvCxnSpPr>
+          <p:nvPr/>
+        </p:nvCxnSpPr>
+        <p:spPr>
+          <a:xfrm>
+            <a:off x="914963" y="2597624"/>
+            <a:ext cx="0" cy="450319"/>
+          </a:xfrm>
+          <a:prstGeom prst="straightConnector1">
+            <a:avLst/>
+          </a:prstGeom>
+          <a:ln w="66675">
+            <a:solidFill>
+              <a:schemeClr val="accent6">
+                <a:lumMod val="50000"/>
+              </a:schemeClr>
+            </a:solidFill>
+            <a:tailEnd type="triangle"/>
+          </a:ln>
+        </p:spPr>
+        <p:style>
+          <a:lnRef idx="1">
+            <a:schemeClr val="accent1"/>
+          </a:lnRef>
+          <a:fillRef idx="0">
+            <a:schemeClr val="accent1"/>
+          </a:fillRef>
+          <a:effectRef idx="0">
+            <a:schemeClr val="accent1"/>
+          </a:effectRef>
+          <a:fontRef idx="minor">
+            <a:schemeClr val="tx1"/>
+          </a:fontRef>
+        </p:style>
+      </p:cxnSp>
+      <p:cxnSp>
+        <p:nvCxnSpPr>
+          <p:cNvPr id="19" name="Straight Arrow Connector 18">
+            <a:extLst>
+              <a:ext uri="{FF2B5EF4-FFF2-40B4-BE49-F238E27FC236}">
+                <a16:creationId xmlns:a16="http://schemas.microsoft.com/office/drawing/2014/main" id="{BECBCFD1-4D84-FC46-21FB-755BC9A706C4}"/>
+              </a:ext>
+            </a:extLst>
+          </p:cNvPr>
+          <p:cNvCxnSpPr>
+            <a:cxnSpLocks/>
+          </p:cNvCxnSpPr>
+          <p:nvPr/>
+        </p:nvCxnSpPr>
+        <p:spPr>
+          <a:xfrm>
+            <a:off x="2790987" y="2597622"/>
+            <a:ext cx="0" cy="450319"/>
+          </a:xfrm>
+          <a:prstGeom prst="straightConnector1">
+            <a:avLst/>
+          </a:prstGeom>
+          <a:ln w="66675">
+            <a:solidFill>
+              <a:schemeClr val="accent6">
+                <a:lumMod val="50000"/>
+              </a:schemeClr>
+            </a:solidFill>
+            <a:tailEnd type="triangle"/>
+          </a:ln>
+        </p:spPr>
+        <p:style>
+          <a:lnRef idx="1">
+            <a:schemeClr val="accent1"/>
+          </a:lnRef>
+          <a:fillRef idx="0">
+            <a:schemeClr val="accent1"/>
+          </a:fillRef>
+          <a:effectRef idx="0">
+            <a:schemeClr val="accent1"/>
+          </a:effectRef>
+          <a:fontRef idx="minor">
+            <a:schemeClr val="tx1"/>
+          </a:fontRef>
+        </p:style>
+      </p:cxnSp>
+      <p:sp>
+        <p:nvSpPr>
+          <p:cNvPr id="20" name="TextBox 19">
+            <a:extLst>
+              <a:ext uri="{FF2B5EF4-FFF2-40B4-BE49-F238E27FC236}">
+                <a16:creationId xmlns:a16="http://schemas.microsoft.com/office/drawing/2014/main" id="{E23E0997-73DE-2A94-0B10-9CBF2E24AF50}"/>
+              </a:ext>
+            </a:extLst>
+          </p:cNvPr>
+          <p:cNvSpPr txBox="1"/>
+          <p:nvPr/>
+        </p:nvSpPr>
+        <p:spPr>
+          <a:xfrm>
+            <a:off x="363545" y="3393290"/>
+            <a:ext cx="1395939" cy="307777"/>
+          </a:xfrm>
+          <a:prstGeom prst="rect">
+            <a:avLst/>
+          </a:prstGeom>
+          <a:noFill/>
+        </p:spPr>
+        <p:txBody>
+          <a:bodyPr wrap="square" rtlCol="0">
+            <a:spAutoFit/>
+          </a:bodyPr>
+          <a:lstStyle/>
+          <a:p>
+            <a:r>
+              <a:rPr lang="en-US" sz="1400" i="1" u="sng" dirty="0" err="1"/>
+              <a:t>UI、Transition</a:t>
+            </a:r>
+            <a:endParaRPr kumimoji="1" lang="en-JP" sz="1400" i="1" u="sng" dirty="0"/>
+          </a:p>
+        </p:txBody>
+      </p:sp>
+      <p:sp>
+        <p:nvSpPr>
+          <p:cNvPr id="21" name="TextBox 20">
+            <a:extLst>
+              <a:ext uri="{FF2B5EF4-FFF2-40B4-BE49-F238E27FC236}">
+                <a16:creationId xmlns:a16="http://schemas.microsoft.com/office/drawing/2014/main" id="{85EACEF8-74A5-E5AA-F164-E6F7B58941A4}"/>
+              </a:ext>
+            </a:extLst>
+          </p:cNvPr>
+          <p:cNvSpPr txBox="1"/>
+          <p:nvPr/>
+        </p:nvSpPr>
+        <p:spPr>
+          <a:xfrm>
+            <a:off x="2353748" y="3348720"/>
+            <a:ext cx="1128145" cy="307777"/>
+          </a:xfrm>
+          <a:prstGeom prst="rect">
+            <a:avLst/>
+          </a:prstGeom>
+          <a:noFill/>
+        </p:spPr>
+        <p:txBody>
+          <a:bodyPr wrap="square" rtlCol="0">
+            <a:spAutoFit/>
+          </a:bodyPr>
+          <a:lstStyle/>
+          <a:p>
+            <a:r>
+              <a:rPr kumimoji="1" lang="en-US" sz="1400" i="1" u="sng" dirty="0"/>
+              <a:t>UI binding</a:t>
+            </a:r>
+            <a:endParaRPr kumimoji="1" lang="en-JP" sz="1400" i="1" u="sng" dirty="0"/>
+          </a:p>
+        </p:txBody>
+      </p:sp>
+      <p:cxnSp>
+        <p:nvCxnSpPr>
+          <p:cNvPr id="22" name="Straight Arrow Connector 21">
+            <a:extLst>
+              <a:ext uri="{FF2B5EF4-FFF2-40B4-BE49-F238E27FC236}">
+                <a16:creationId xmlns:a16="http://schemas.microsoft.com/office/drawing/2014/main" id="{002CC68D-3D7F-39DB-CE9A-835E5975B121}"/>
+              </a:ext>
+            </a:extLst>
+          </p:cNvPr>
+          <p:cNvCxnSpPr>
+            <a:cxnSpLocks/>
+          </p:cNvCxnSpPr>
+          <p:nvPr/>
+        </p:nvCxnSpPr>
+        <p:spPr>
+          <a:xfrm>
+            <a:off x="4651484" y="2597623"/>
+            <a:ext cx="0" cy="450319"/>
+          </a:xfrm>
+          <a:prstGeom prst="straightConnector1">
+            <a:avLst/>
+          </a:prstGeom>
+          <a:ln w="66675">
+            <a:solidFill>
+              <a:schemeClr val="accent6">
+                <a:lumMod val="50000"/>
+              </a:schemeClr>
+            </a:solidFill>
+            <a:tailEnd type="triangle"/>
+          </a:ln>
+        </p:spPr>
+        <p:style>
+          <a:lnRef idx="1">
+            <a:schemeClr val="accent1"/>
+          </a:lnRef>
+          <a:fillRef idx="0">
+            <a:schemeClr val="accent1"/>
+          </a:fillRef>
+          <a:effectRef idx="0">
+            <a:schemeClr val="accent1"/>
+          </a:effectRef>
+          <a:fontRef idx="minor">
+            <a:schemeClr val="tx1"/>
+          </a:fontRef>
+        </p:style>
+      </p:cxnSp>
+      <p:sp>
+        <p:nvSpPr>
+          <p:cNvPr id="23" name="TextBox 22">
+            <a:extLst>
+              <a:ext uri="{FF2B5EF4-FFF2-40B4-BE49-F238E27FC236}">
+                <a16:creationId xmlns:a16="http://schemas.microsoft.com/office/drawing/2014/main" id="{94B76862-3AAF-5813-79F3-1B2337357958}"/>
+              </a:ext>
+            </a:extLst>
+          </p:cNvPr>
+          <p:cNvSpPr txBox="1"/>
+          <p:nvPr/>
+        </p:nvSpPr>
+        <p:spPr>
+          <a:xfrm>
+            <a:off x="3983109" y="3332792"/>
+            <a:ext cx="1382235" cy="523220"/>
+          </a:xfrm>
+          <a:prstGeom prst="rect">
+            <a:avLst/>
+          </a:prstGeom>
+          <a:noFill/>
+        </p:spPr>
+        <p:txBody>
+          <a:bodyPr wrap="square" rtlCol="0">
+            <a:spAutoFit/>
+          </a:bodyPr>
+          <a:lstStyle/>
+          <a:p>
+            <a:r>
+              <a:rPr kumimoji="1" lang="en-US" sz="1400" i="1" u="sng" dirty="0"/>
+              <a:t>Business logic</a:t>
+            </a:r>
+          </a:p>
+          <a:p>
+            <a:pPr algn="ctr"/>
+            <a:r>
+              <a:rPr lang="en-US" sz="1400" b="1" u="sng" dirty="0"/>
+              <a:t>( Optional )</a:t>
+            </a:r>
+            <a:endParaRPr kumimoji="1" lang="en-JP" sz="1400" b="1" u="sng" dirty="0"/>
+          </a:p>
+        </p:txBody>
+      </p:sp>
+      <p:sp>
+        <p:nvSpPr>
+          <p:cNvPr id="24" name="TextBox 23">
+            <a:extLst>
+              <a:ext uri="{FF2B5EF4-FFF2-40B4-BE49-F238E27FC236}">
+                <a16:creationId xmlns:a16="http://schemas.microsoft.com/office/drawing/2014/main" id="{7E6A0028-7104-A9A0-ABF8-DA0A965842A1}"/>
+              </a:ext>
+            </a:extLst>
+          </p:cNvPr>
+          <p:cNvSpPr txBox="1"/>
+          <p:nvPr/>
+        </p:nvSpPr>
+        <p:spPr>
+          <a:xfrm>
+            <a:off x="5857652" y="3332794"/>
+            <a:ext cx="1302399" cy="307777"/>
+          </a:xfrm>
+          <a:prstGeom prst="rect">
+            <a:avLst/>
+          </a:prstGeom>
+          <a:noFill/>
+        </p:spPr>
+        <p:txBody>
+          <a:bodyPr wrap="square" rtlCol="0">
+            <a:spAutoFit/>
+          </a:bodyPr>
+          <a:lstStyle/>
+          <a:p>
+            <a:r>
+              <a:rPr lang="en-US" sz="1400" i="1" u="sng" dirty="0"/>
+              <a:t>Scenario flow</a:t>
+            </a:r>
+            <a:endParaRPr kumimoji="1" lang="en-JP" sz="1400" i="1" u="sng" dirty="0"/>
+          </a:p>
+        </p:txBody>
+      </p:sp>
+      <p:cxnSp>
+        <p:nvCxnSpPr>
+          <p:cNvPr id="25" name="Straight Arrow Connector 24">
+            <a:extLst>
+              <a:ext uri="{FF2B5EF4-FFF2-40B4-BE49-F238E27FC236}">
+                <a16:creationId xmlns:a16="http://schemas.microsoft.com/office/drawing/2014/main" id="{C162DB3C-62A9-6C2C-C521-29D131A13EC0}"/>
+              </a:ext>
+            </a:extLst>
+          </p:cNvPr>
+          <p:cNvCxnSpPr>
+            <a:cxnSpLocks/>
+          </p:cNvCxnSpPr>
+          <p:nvPr/>
+        </p:nvCxnSpPr>
+        <p:spPr>
+          <a:xfrm>
+            <a:off x="6439225" y="2597624"/>
+            <a:ext cx="0" cy="450319"/>
+          </a:xfrm>
+          <a:prstGeom prst="straightConnector1">
+            <a:avLst/>
+          </a:prstGeom>
+          <a:ln w="66675">
+            <a:solidFill>
+              <a:schemeClr val="accent6">
+                <a:lumMod val="50000"/>
+              </a:schemeClr>
+            </a:solidFill>
+            <a:tailEnd type="triangle"/>
+          </a:ln>
+        </p:spPr>
+        <p:style>
+          <a:lnRef idx="1">
+            <a:schemeClr val="accent1"/>
+          </a:lnRef>
+          <a:fillRef idx="0">
+            <a:schemeClr val="accent1"/>
+          </a:fillRef>
+          <a:effectRef idx="0">
+            <a:schemeClr val="accent1"/>
+          </a:effectRef>
+          <a:fontRef idx="minor">
+            <a:schemeClr val="tx1"/>
+          </a:fontRef>
+        </p:style>
+      </p:cxnSp>
+      <p:cxnSp>
+        <p:nvCxnSpPr>
+          <p:cNvPr id="26" name="Straight Arrow Connector 25">
+            <a:extLst>
+              <a:ext uri="{FF2B5EF4-FFF2-40B4-BE49-F238E27FC236}">
+                <a16:creationId xmlns:a16="http://schemas.microsoft.com/office/drawing/2014/main" id="{1F9E8D08-15A7-167D-4136-3AD74FF952F7}"/>
+              </a:ext>
+            </a:extLst>
+          </p:cNvPr>
+          <p:cNvCxnSpPr>
+            <a:cxnSpLocks/>
+          </p:cNvCxnSpPr>
+          <p:nvPr/>
+        </p:nvCxnSpPr>
+        <p:spPr>
+          <a:xfrm>
+            <a:off x="8393736" y="2565546"/>
+            <a:ext cx="0" cy="450319"/>
+          </a:xfrm>
+          <a:prstGeom prst="straightConnector1">
+            <a:avLst/>
+          </a:prstGeom>
+          <a:ln w="66675">
+            <a:solidFill>
+              <a:schemeClr val="accent6">
+                <a:lumMod val="50000"/>
+              </a:schemeClr>
+            </a:solidFill>
+            <a:tailEnd type="triangle"/>
+          </a:ln>
+        </p:spPr>
+        <p:style>
+          <a:lnRef idx="1">
+            <a:schemeClr val="accent1"/>
+          </a:lnRef>
+          <a:fillRef idx="0">
+            <a:schemeClr val="accent1"/>
+          </a:fillRef>
+          <a:effectRef idx="0">
+            <a:schemeClr val="accent1"/>
+          </a:effectRef>
+          <a:fontRef idx="minor">
+            <a:schemeClr val="tx1"/>
+          </a:fontRef>
+        </p:style>
+      </p:cxnSp>
+      <p:sp>
+        <p:nvSpPr>
+          <p:cNvPr id="28" name="TextBox 27">
+            <a:extLst>
+              <a:ext uri="{FF2B5EF4-FFF2-40B4-BE49-F238E27FC236}">
+                <a16:creationId xmlns:a16="http://schemas.microsoft.com/office/drawing/2014/main" id="{92DB1683-18F5-CC4A-94C9-A9ADE63B2673}"/>
+              </a:ext>
+            </a:extLst>
+          </p:cNvPr>
+          <p:cNvSpPr txBox="1"/>
+          <p:nvPr/>
+        </p:nvSpPr>
+        <p:spPr>
+          <a:xfrm>
+            <a:off x="7588964" y="3332793"/>
+            <a:ext cx="1820373" cy="307777"/>
+          </a:xfrm>
+          <a:prstGeom prst="rect">
+            <a:avLst/>
+          </a:prstGeom>
+          <a:noFill/>
+        </p:spPr>
+        <p:txBody>
+          <a:bodyPr wrap="square" rtlCol="0">
+            <a:spAutoFit/>
+          </a:bodyPr>
+          <a:lstStyle/>
+          <a:p>
+            <a:r>
+              <a:rPr lang="en-US" sz="1400" i="1" u="sng" dirty="0"/>
+              <a:t>Feature data object</a:t>
+            </a:r>
+            <a:endParaRPr kumimoji="1" lang="en-JP" sz="1400" i="1" u="sng" dirty="0"/>
+          </a:p>
+        </p:txBody>
+      </p:sp>
+      <p:sp>
+        <p:nvSpPr>
+          <p:cNvPr id="29" name="正方形/長方形 34">
+            <a:extLst>
+              <a:ext uri="{FF2B5EF4-FFF2-40B4-BE49-F238E27FC236}">
+                <a16:creationId xmlns:a16="http://schemas.microsoft.com/office/drawing/2014/main" id="{C9F4F6CD-6A14-5140-E3EB-5A605C29FF49}"/>
+              </a:ext>
+            </a:extLst>
+          </p:cNvPr>
+          <p:cNvSpPr/>
+          <p:nvPr/>
+        </p:nvSpPr>
+        <p:spPr>
+          <a:xfrm>
+            <a:off x="1971220" y="4470054"/>
+            <a:ext cx="2029065" cy="423145"/>
+          </a:xfrm>
+          <a:prstGeom prst="rect">
+            <a:avLst/>
+          </a:prstGeom>
+          <a:solidFill>
+            <a:schemeClr val="accent4">
+              <a:lumMod val="50000"/>
+            </a:schemeClr>
+          </a:solidFill>
+          <a:ln>
+            <a:noFill/>
+          </a:ln>
+        </p:spPr>
+        <p:style>
+          <a:lnRef idx="2">
+            <a:schemeClr val="accent1">
+              <a:shade val="50000"/>
+            </a:schemeClr>
+          </a:lnRef>
+          <a:fillRef idx="1">
+            <a:schemeClr val="accent1"/>
+          </a:fillRef>
+          <a:effectRef idx="0">
+            <a:schemeClr val="accent1"/>
+          </a:effectRef>
+          <a:fontRef idx="minor">
+            <a:schemeClr val="lt1"/>
+          </a:fontRef>
+        </p:style>
+        <p:txBody>
+          <a:bodyPr rtlCol="0" anchor="ctr"/>
+          <a:lstStyle/>
+          <a:p>
+            <a:pPr algn="ctr"/>
+            <a:r>
+              <a:rPr kumimoji="1" lang="en-US" sz="1300" b="1" dirty="0">
+                <a:solidFill>
+                  <a:schemeClr val="bg1"/>
+                </a:solidFill>
+              </a:rPr>
+              <a:t>DTO </a:t>
+            </a:r>
+          </a:p>
+          <a:p>
+            <a:pPr algn="ctr"/>
+            <a:r>
+              <a:rPr lang="en-US" sz="1300" b="1" dirty="0">
+                <a:solidFill>
+                  <a:schemeClr val="bg1"/>
+                </a:solidFill>
+              </a:rPr>
+              <a:t>(Data Transfer Object )</a:t>
+            </a:r>
+            <a:endParaRPr kumimoji="1" lang="en-US" sz="1300" b="1" dirty="0">
+              <a:solidFill>
+                <a:schemeClr val="bg1"/>
+              </a:solidFill>
+            </a:endParaRPr>
+          </a:p>
+        </p:txBody>
+      </p:sp>
+      <p:cxnSp>
+        <p:nvCxnSpPr>
+          <p:cNvPr id="30" name="Straight Arrow Connector 29">
+            <a:extLst>
+              <a:ext uri="{FF2B5EF4-FFF2-40B4-BE49-F238E27FC236}">
+                <a16:creationId xmlns:a16="http://schemas.microsoft.com/office/drawing/2014/main" id="{4214A000-CB49-6383-2D61-CCB6E7A6357C}"/>
+              </a:ext>
+            </a:extLst>
+          </p:cNvPr>
+          <p:cNvCxnSpPr>
+            <a:cxnSpLocks/>
+          </p:cNvCxnSpPr>
+          <p:nvPr/>
+        </p:nvCxnSpPr>
+        <p:spPr>
+          <a:xfrm>
+            <a:off x="945999" y="5209444"/>
+            <a:ext cx="0" cy="450319"/>
+          </a:xfrm>
+          <a:prstGeom prst="straightConnector1">
+            <a:avLst/>
+          </a:prstGeom>
+          <a:ln w="66675">
+            <a:solidFill>
+              <a:schemeClr val="accent6">
+                <a:lumMod val="50000"/>
+              </a:schemeClr>
+            </a:solidFill>
+            <a:tailEnd type="triangle"/>
+          </a:ln>
+        </p:spPr>
+        <p:style>
+          <a:lnRef idx="1">
+            <a:schemeClr val="accent1"/>
+          </a:lnRef>
+          <a:fillRef idx="0">
+            <a:schemeClr val="accent1"/>
+          </a:fillRef>
+          <a:effectRef idx="0">
+            <a:schemeClr val="accent1"/>
+          </a:effectRef>
+          <a:fontRef idx="minor">
+            <a:schemeClr val="tx1"/>
+          </a:fontRef>
+        </p:style>
+      </p:cxnSp>
+      <p:cxnSp>
+        <p:nvCxnSpPr>
+          <p:cNvPr id="31" name="Straight Arrow Connector 30">
+            <a:extLst>
+              <a:ext uri="{FF2B5EF4-FFF2-40B4-BE49-F238E27FC236}">
+                <a16:creationId xmlns:a16="http://schemas.microsoft.com/office/drawing/2014/main" id="{1529E91D-995B-45D3-FF7D-52DB894AF036}"/>
+              </a:ext>
+            </a:extLst>
+          </p:cNvPr>
+          <p:cNvCxnSpPr>
+            <a:cxnSpLocks/>
+          </p:cNvCxnSpPr>
+          <p:nvPr/>
+        </p:nvCxnSpPr>
+        <p:spPr>
+          <a:xfrm>
+            <a:off x="2917820" y="5209443"/>
+            <a:ext cx="0" cy="450319"/>
+          </a:xfrm>
+          <a:prstGeom prst="straightConnector1">
+            <a:avLst/>
+          </a:prstGeom>
+          <a:ln w="66675">
+            <a:solidFill>
+              <a:schemeClr val="accent6">
+                <a:lumMod val="50000"/>
+              </a:schemeClr>
+            </a:solidFill>
+            <a:tailEnd type="triangle"/>
+          </a:ln>
+        </p:spPr>
+        <p:style>
+          <a:lnRef idx="1">
+            <a:schemeClr val="accent1"/>
+          </a:lnRef>
+          <a:fillRef idx="0">
+            <a:schemeClr val="accent1"/>
+          </a:fillRef>
+          <a:effectRef idx="0">
+            <a:schemeClr val="accent1"/>
+          </a:effectRef>
+          <a:fontRef idx="minor">
+            <a:schemeClr val="tx1"/>
+          </a:fontRef>
+        </p:style>
+      </p:cxnSp>
+      <p:sp>
+        <p:nvSpPr>
+          <p:cNvPr id="32" name="TextBox 31">
+            <a:extLst>
+              <a:ext uri="{FF2B5EF4-FFF2-40B4-BE49-F238E27FC236}">
+                <a16:creationId xmlns:a16="http://schemas.microsoft.com/office/drawing/2014/main" id="{F6103397-A0D3-6C66-DA79-E91CE697AC52}"/>
+              </a:ext>
+            </a:extLst>
+          </p:cNvPr>
+          <p:cNvSpPr txBox="1"/>
+          <p:nvPr/>
+        </p:nvSpPr>
+        <p:spPr>
+          <a:xfrm>
+            <a:off x="415322" y="5822572"/>
+            <a:ext cx="1195093" cy="307777"/>
+          </a:xfrm>
+          <a:prstGeom prst="rect">
+            <a:avLst/>
+          </a:prstGeom>
+          <a:noFill/>
+        </p:spPr>
+        <p:txBody>
+          <a:bodyPr wrap="square" rtlCol="0">
+            <a:spAutoFit/>
+          </a:bodyPr>
+          <a:lstStyle/>
+          <a:p>
+            <a:r>
+              <a:rPr lang="en-US" sz="1400" i="1" u="sng" dirty="0"/>
+              <a:t>Data source</a:t>
+            </a:r>
+            <a:endParaRPr kumimoji="1" lang="en-JP" sz="1400" i="1" u="sng" dirty="0"/>
+          </a:p>
+        </p:txBody>
+      </p:sp>
+      <p:sp>
+        <p:nvSpPr>
+          <p:cNvPr id="33" name="TextBox 32">
+            <a:extLst>
+              <a:ext uri="{FF2B5EF4-FFF2-40B4-BE49-F238E27FC236}">
+                <a16:creationId xmlns:a16="http://schemas.microsoft.com/office/drawing/2014/main" id="{61378229-DA25-1038-3815-CE3261C3FD8F}"/>
+              </a:ext>
+            </a:extLst>
+          </p:cNvPr>
+          <p:cNvSpPr txBox="1"/>
+          <p:nvPr/>
+        </p:nvSpPr>
+        <p:spPr>
+          <a:xfrm>
+            <a:off x="2129504" y="5822117"/>
+            <a:ext cx="1712496" cy="307777"/>
+          </a:xfrm>
+          <a:prstGeom prst="rect">
+            <a:avLst/>
+          </a:prstGeom>
+          <a:noFill/>
+        </p:spPr>
+        <p:txBody>
+          <a:bodyPr wrap="square" rtlCol="0">
+            <a:spAutoFit/>
+          </a:bodyPr>
+          <a:lstStyle/>
+          <a:p>
+            <a:r>
+              <a:rPr lang="en-US" sz="1400" i="1" u="sng" dirty="0"/>
+              <a:t>Convert response</a:t>
+            </a:r>
+            <a:endParaRPr kumimoji="1" lang="en-JP" sz="1400" i="1" u="sng" dirty="0"/>
+          </a:p>
+        </p:txBody>
+      </p:sp>
+    </p:spTree>
+    <p:extLst>
+      <p:ext uri="{BB962C8B-B14F-4D97-AF65-F5344CB8AC3E}">
+        <p14:creationId xmlns:p14="http://schemas.microsoft.com/office/powerpoint/2010/main" val="3064127956"/>
+      </p:ext>
+    </p:extLst>
+  </p:cSld>
+  <p:clrMapOvr>
+    <a:masterClrMapping/>
+  </p:clrMapOvr>
+</p:sld>
+</file>
+
+<file path=ppt/slides/slide6.xml><?xml version="1.0" encoding="utf-8"?>
+<p:sld xmlns:a="http://schemas.openxmlformats.org/drawingml/2006/main" xmlns:r="http://schemas.openxmlformats.org/officeDocument/2006/relationships" xmlns:p="http://schemas.openxmlformats.org/presentationml/2006/main">
+  <p:cSld>
+    <p:spTree>
+      <p:nvGrpSpPr>
+        <p:cNvPr id="1" name=""/>
+        <p:cNvGrpSpPr/>
+        <p:nvPr/>
+      </p:nvGrpSpPr>
+      <p:grpSpPr>
+        <a:xfrm>
+          <a:off x="0" y="0"/>
+          <a:ext cx="0" cy="0"/>
+          <a:chOff x="0" y="0"/>
+          <a:chExt cx="0" cy="0"/>
+        </a:xfrm>
+      </p:grpSpPr>
+      <p:sp>
+        <p:nvSpPr>
+          <p:cNvPr id="2" name="タイトル 1"/>
+          <p:cNvSpPr>
+            <a:spLocks noGrp="1"/>
+          </p:cNvSpPr>
+          <p:nvPr>
+            <p:ph type="title"/>
+          </p:nvPr>
+        </p:nvSpPr>
+        <p:spPr/>
+        <p:txBody>
+          <a:bodyPr>
+            <a:noAutofit/>
+          </a:bodyPr>
+          <a:lstStyle/>
+          <a:p>
+            <a:pPr algn="ctr"/>
+            <a:r>
+              <a:rPr lang="en-US" altLang="ja-JP" sz="3600" b="1" dirty="0"/>
+              <a:t>Create a container</a:t>
+            </a:r>
+            <a:endParaRPr lang="ja-JP" altLang="en-US" sz="3600" b="1" kern="0" dirty="0"/>
+          </a:p>
+        </p:txBody>
+      </p:sp>
+      <p:cxnSp>
+        <p:nvCxnSpPr>
+          <p:cNvPr id="8" name="Straight Connector 7">
+            <a:extLst>
+              <a:ext uri="{FF2B5EF4-FFF2-40B4-BE49-F238E27FC236}">
+                <a16:creationId xmlns:a16="http://schemas.microsoft.com/office/drawing/2014/main" id="{0F07A22E-5A49-9049-9297-0D650C8F1F64}"/>
+              </a:ext>
+            </a:extLst>
+          </p:cNvPr>
+          <p:cNvCxnSpPr>
+            <a:cxnSpLocks/>
+          </p:cNvCxnSpPr>
+          <p:nvPr/>
+        </p:nvCxnSpPr>
+        <p:spPr>
+          <a:xfrm>
+            <a:off x="797441" y="950071"/>
+            <a:ext cx="10047768" cy="0"/>
+          </a:xfrm>
+          <a:prstGeom prst="line">
+            <a:avLst/>
+          </a:prstGeom>
+          <a:ln/>
+        </p:spPr>
+        <p:style>
+          <a:lnRef idx="2">
+            <a:schemeClr val="dk1"/>
+          </a:lnRef>
+          <a:fillRef idx="0">
+            <a:schemeClr val="dk1"/>
+          </a:fillRef>
+          <a:effectRef idx="1">
+            <a:schemeClr val="dk1"/>
+          </a:effectRef>
+          <a:fontRef idx="minor">
+            <a:schemeClr val="tx1"/>
+          </a:fontRef>
+        </p:style>
+      </p:cxnSp>
+      <p:sp>
+        <p:nvSpPr>
+          <p:cNvPr id="3" name="正方形/長方形 34">
+            <a:extLst>
+              <a:ext uri="{FF2B5EF4-FFF2-40B4-BE49-F238E27FC236}">
+                <a16:creationId xmlns:a16="http://schemas.microsoft.com/office/drawing/2014/main" id="{A7187707-2915-2D5A-202D-E35793A539E5}"/>
+              </a:ext>
+            </a:extLst>
+          </p:cNvPr>
+          <p:cNvSpPr/>
+          <p:nvPr/>
+        </p:nvSpPr>
+        <p:spPr>
+          <a:xfrm>
+            <a:off x="1641529" y="1759536"/>
+            <a:ext cx="1500411" cy="477896"/>
+          </a:xfrm>
+          <a:prstGeom prst="rect">
+            <a:avLst/>
+          </a:prstGeom>
+          <a:solidFill>
+            <a:schemeClr val="accent6">
+              <a:lumMod val="50000"/>
+            </a:schemeClr>
+          </a:solidFill>
+          <a:ln>
+            <a:noFill/>
+          </a:ln>
+        </p:spPr>
+        <p:style>
+          <a:lnRef idx="2">
+            <a:schemeClr val="accent1">
+              <a:shade val="50000"/>
+            </a:schemeClr>
+          </a:lnRef>
+          <a:fillRef idx="1">
+            <a:schemeClr val="accent1"/>
+          </a:fillRef>
+          <a:effectRef idx="0">
+            <a:schemeClr val="accent1"/>
+          </a:effectRef>
+          <a:fontRef idx="minor">
+            <a:schemeClr val="lt1"/>
+          </a:fontRef>
+        </p:style>
+        <p:txBody>
+          <a:bodyPr rtlCol="0" anchor="ctr"/>
+          <a:lstStyle/>
+          <a:p>
+            <a:pPr algn="ctr"/>
+            <a:r>
+              <a:rPr kumimoji="1" lang="en-US" sz="1300" b="1" dirty="0" err="1">
+                <a:solidFill>
+                  <a:schemeClr val="bg1"/>
+                </a:solidFill>
+              </a:rPr>
+              <a:t>PaymentMethod</a:t>
+            </a:r>
+            <a:endParaRPr kumimoji="1" lang="en-US" sz="1300" b="1" dirty="0">
+              <a:solidFill>
+                <a:schemeClr val="bg1"/>
+              </a:solidFill>
+            </a:endParaRPr>
+          </a:p>
+        </p:txBody>
+      </p:sp>
+      <p:sp>
+        <p:nvSpPr>
+          <p:cNvPr id="20" name="TextBox 19">
+            <a:extLst>
+              <a:ext uri="{FF2B5EF4-FFF2-40B4-BE49-F238E27FC236}">
+                <a16:creationId xmlns:a16="http://schemas.microsoft.com/office/drawing/2014/main" id="{E23E0997-73DE-2A94-0B10-9CBF2E24AF50}"/>
+              </a:ext>
+            </a:extLst>
+          </p:cNvPr>
+          <p:cNvSpPr txBox="1"/>
+          <p:nvPr/>
+        </p:nvSpPr>
+        <p:spPr>
+          <a:xfrm>
+            <a:off x="334964" y="1066964"/>
+            <a:ext cx="1395939" cy="307777"/>
+          </a:xfrm>
+          <a:prstGeom prst="rect">
+            <a:avLst/>
+          </a:prstGeom>
+          <a:noFill/>
+        </p:spPr>
+        <p:txBody>
+          <a:bodyPr wrap="square" rtlCol="0">
+            <a:spAutoFit/>
+          </a:bodyPr>
+          <a:lstStyle/>
+          <a:p>
+            <a:r>
+              <a:rPr lang="en-JP" sz="1400" i="1" u="sng" dirty="0"/>
+              <a:t>Feature tree</a:t>
+            </a:r>
+            <a:endParaRPr kumimoji="1" lang="en-US" sz="1400" i="1" u="sng" dirty="0"/>
+          </a:p>
+        </p:txBody>
+      </p:sp>
+      <p:sp>
+        <p:nvSpPr>
+          <p:cNvPr id="6" name="正方形/長方形 34">
+            <a:extLst>
+              <a:ext uri="{FF2B5EF4-FFF2-40B4-BE49-F238E27FC236}">
+                <a16:creationId xmlns:a16="http://schemas.microsoft.com/office/drawing/2014/main" id="{FA92DC96-FB5D-0AB3-785D-EF49EF6C2FE9}"/>
+              </a:ext>
+            </a:extLst>
+          </p:cNvPr>
+          <p:cNvSpPr/>
+          <p:nvPr/>
+        </p:nvSpPr>
+        <p:spPr>
+          <a:xfrm>
+            <a:off x="4090125" y="2281728"/>
+            <a:ext cx="1500411" cy="393169"/>
+          </a:xfrm>
+          <a:prstGeom prst="rect">
+            <a:avLst/>
+          </a:prstGeom>
+          <a:solidFill>
+            <a:schemeClr val="accent6">
+              <a:lumMod val="50000"/>
+            </a:schemeClr>
+          </a:solidFill>
+          <a:ln>
+            <a:noFill/>
+          </a:ln>
+        </p:spPr>
+        <p:style>
+          <a:lnRef idx="2">
+            <a:schemeClr val="accent1">
+              <a:shade val="50000"/>
+            </a:schemeClr>
+          </a:lnRef>
+          <a:fillRef idx="1">
+            <a:schemeClr val="accent1"/>
+          </a:fillRef>
+          <a:effectRef idx="0">
+            <a:schemeClr val="accent1"/>
+          </a:effectRef>
+          <a:fontRef idx="minor">
+            <a:schemeClr val="lt1"/>
+          </a:fontRef>
+        </p:style>
+        <p:txBody>
+          <a:bodyPr rtlCol="0" anchor="ctr"/>
+          <a:lstStyle/>
+          <a:p>
+            <a:pPr algn="ctr"/>
+            <a:r>
+              <a:rPr kumimoji="1" lang="en-US" sz="1300" b="1" dirty="0" err="1">
+                <a:solidFill>
+                  <a:schemeClr val="bg1"/>
+                </a:solidFill>
+              </a:rPr>
+              <a:t>OPBarcode</a:t>
+            </a:r>
+            <a:endParaRPr kumimoji="1" lang="en-US" sz="1300" b="1" dirty="0">
+              <a:solidFill>
+                <a:schemeClr val="bg1"/>
+              </a:solidFill>
+            </a:endParaRPr>
+          </a:p>
+        </p:txBody>
+      </p:sp>
+      <p:sp>
+        <p:nvSpPr>
+          <p:cNvPr id="13" name="正方形/長方形 34">
+            <a:extLst>
+              <a:ext uri="{FF2B5EF4-FFF2-40B4-BE49-F238E27FC236}">
+                <a16:creationId xmlns:a16="http://schemas.microsoft.com/office/drawing/2014/main" id="{94F75C62-59A5-4492-24C2-7BEEF3B621C7}"/>
+              </a:ext>
+            </a:extLst>
+          </p:cNvPr>
+          <p:cNvSpPr/>
+          <p:nvPr/>
+        </p:nvSpPr>
+        <p:spPr>
+          <a:xfrm>
+            <a:off x="4090125" y="4519628"/>
+            <a:ext cx="1500411" cy="393169"/>
+          </a:xfrm>
+          <a:prstGeom prst="rect">
+            <a:avLst/>
+          </a:prstGeom>
+          <a:solidFill>
+            <a:schemeClr val="accent6">
+              <a:lumMod val="50000"/>
+            </a:schemeClr>
+          </a:solidFill>
+          <a:ln>
+            <a:noFill/>
+          </a:ln>
+        </p:spPr>
+        <p:style>
+          <a:lnRef idx="2">
+            <a:schemeClr val="accent1">
+              <a:shade val="50000"/>
+            </a:schemeClr>
+          </a:lnRef>
+          <a:fillRef idx="1">
+            <a:schemeClr val="accent1"/>
+          </a:fillRef>
+          <a:effectRef idx="0">
+            <a:schemeClr val="accent1"/>
+          </a:effectRef>
+          <a:fontRef idx="minor">
+            <a:schemeClr val="lt1"/>
+          </a:fontRef>
+        </p:style>
+        <p:txBody>
+          <a:bodyPr rtlCol="0" anchor="ctr"/>
+          <a:lstStyle/>
+          <a:p>
+            <a:pPr algn="ctr"/>
+            <a:r>
+              <a:rPr kumimoji="1" lang="en-US" sz="1300" b="1" dirty="0">
+                <a:solidFill>
+                  <a:schemeClr val="bg1"/>
+                </a:solidFill>
+              </a:rPr>
+              <a:t>Balance refresh</a:t>
+            </a:r>
+          </a:p>
+        </p:txBody>
+      </p:sp>
+      <p:sp>
+        <p:nvSpPr>
+          <p:cNvPr id="34" name="正方形/長方形 34">
+            <a:extLst>
+              <a:ext uri="{FF2B5EF4-FFF2-40B4-BE49-F238E27FC236}">
+                <a16:creationId xmlns:a16="http://schemas.microsoft.com/office/drawing/2014/main" id="{E0BE407D-C6A7-4815-9CC3-6F0B788C3739}"/>
+              </a:ext>
+            </a:extLst>
+          </p:cNvPr>
+          <p:cNvSpPr/>
+          <p:nvPr/>
+        </p:nvSpPr>
+        <p:spPr>
+          <a:xfrm>
+            <a:off x="1641530" y="5545230"/>
+            <a:ext cx="1826500" cy="477896"/>
+          </a:xfrm>
+          <a:prstGeom prst="rect">
+            <a:avLst/>
+          </a:prstGeom>
+          <a:solidFill>
+            <a:schemeClr val="accent6">
+              <a:lumMod val="50000"/>
+            </a:schemeClr>
+          </a:solidFill>
+          <a:ln>
+            <a:noFill/>
+          </a:ln>
+        </p:spPr>
+        <p:style>
+          <a:lnRef idx="2">
+            <a:schemeClr val="accent1">
+              <a:shade val="50000"/>
+            </a:schemeClr>
+          </a:lnRef>
+          <a:fillRef idx="1">
+            <a:schemeClr val="accent1"/>
+          </a:fillRef>
+          <a:effectRef idx="0">
+            <a:schemeClr val="accent1"/>
+          </a:effectRef>
+          <a:fontRef idx="minor">
+            <a:schemeClr val="lt1"/>
+          </a:fontRef>
+        </p:style>
+        <p:txBody>
+          <a:bodyPr rtlCol="0" anchor="ctr"/>
+          <a:lstStyle/>
+          <a:p>
+            <a:pPr algn="ctr"/>
+            <a:r>
+              <a:rPr kumimoji="1" lang="en-US" sz="1300" b="1" dirty="0">
+                <a:solidFill>
+                  <a:schemeClr val="bg1"/>
+                </a:solidFill>
+              </a:rPr>
+              <a:t>Hamburger Menu</a:t>
+            </a:r>
+          </a:p>
+        </p:txBody>
+      </p:sp>
+      <p:sp>
+        <p:nvSpPr>
+          <p:cNvPr id="35" name="正方形/長方形 34">
+            <a:extLst>
+              <a:ext uri="{FF2B5EF4-FFF2-40B4-BE49-F238E27FC236}">
+                <a16:creationId xmlns:a16="http://schemas.microsoft.com/office/drawing/2014/main" id="{AA1234C5-8FA7-7A24-AF14-50B7D9326A97}"/>
+              </a:ext>
+            </a:extLst>
+          </p:cNvPr>
+          <p:cNvSpPr/>
+          <p:nvPr/>
+        </p:nvSpPr>
+        <p:spPr>
+          <a:xfrm>
+            <a:off x="4090125" y="3429000"/>
+            <a:ext cx="1500411" cy="393169"/>
+          </a:xfrm>
+          <a:prstGeom prst="rect">
+            <a:avLst/>
+          </a:prstGeom>
+          <a:solidFill>
+            <a:schemeClr val="accent6">
+              <a:lumMod val="50000"/>
+            </a:schemeClr>
+          </a:solidFill>
+          <a:ln>
+            <a:noFill/>
+          </a:ln>
+        </p:spPr>
+        <p:style>
+          <a:lnRef idx="2">
+            <a:schemeClr val="accent1">
+              <a:shade val="50000"/>
+            </a:schemeClr>
+          </a:lnRef>
+          <a:fillRef idx="1">
+            <a:schemeClr val="accent1"/>
+          </a:fillRef>
+          <a:effectRef idx="0">
+            <a:schemeClr val="accent1"/>
+          </a:effectRef>
+          <a:fontRef idx="minor">
+            <a:schemeClr val="lt1"/>
+          </a:fontRef>
+        </p:style>
+        <p:txBody>
+          <a:bodyPr rtlCol="0" anchor="ctr"/>
+          <a:lstStyle/>
+          <a:p>
+            <a:pPr algn="ctr"/>
+            <a:r>
+              <a:rPr kumimoji="1" lang="en-US" sz="1300" b="1" dirty="0" err="1">
+                <a:solidFill>
+                  <a:schemeClr val="bg1"/>
+                </a:solidFill>
+              </a:rPr>
+              <a:t>Rcash</a:t>
+            </a:r>
+            <a:r>
+              <a:rPr kumimoji="1" lang="en-US" sz="1300" b="1" dirty="0">
+                <a:solidFill>
+                  <a:schemeClr val="bg1"/>
+                </a:solidFill>
+              </a:rPr>
+              <a:t> charge</a:t>
+            </a:r>
+          </a:p>
+        </p:txBody>
+      </p:sp>
+      <p:sp>
+        <p:nvSpPr>
+          <p:cNvPr id="36" name="正方形/長方形 34">
+            <a:extLst>
+              <a:ext uri="{FF2B5EF4-FFF2-40B4-BE49-F238E27FC236}">
+                <a16:creationId xmlns:a16="http://schemas.microsoft.com/office/drawing/2014/main" id="{F9E5739F-C739-8FF5-7602-7072E876025C}"/>
+              </a:ext>
+            </a:extLst>
+          </p:cNvPr>
+          <p:cNvSpPr/>
+          <p:nvPr/>
+        </p:nvSpPr>
+        <p:spPr>
+          <a:xfrm>
+            <a:off x="1641529" y="3744480"/>
+            <a:ext cx="1500411" cy="477896"/>
+          </a:xfrm>
+          <a:prstGeom prst="rect">
+            <a:avLst/>
+          </a:prstGeom>
+          <a:solidFill>
+            <a:schemeClr val="accent6">
+              <a:lumMod val="50000"/>
+            </a:schemeClr>
+          </a:solidFill>
+          <a:ln>
+            <a:noFill/>
+          </a:ln>
+        </p:spPr>
+        <p:style>
+          <a:lnRef idx="2">
+            <a:schemeClr val="accent1">
+              <a:shade val="50000"/>
+            </a:schemeClr>
+          </a:lnRef>
+          <a:fillRef idx="1">
+            <a:schemeClr val="accent1"/>
+          </a:fillRef>
+          <a:effectRef idx="0">
+            <a:schemeClr val="accent1"/>
+          </a:effectRef>
+          <a:fontRef idx="minor">
+            <a:schemeClr val="lt1"/>
+          </a:fontRef>
+        </p:style>
+        <p:txBody>
+          <a:bodyPr rtlCol="0" anchor="ctr"/>
+          <a:lstStyle/>
+          <a:p>
+            <a:pPr algn="ctr"/>
+            <a:r>
+              <a:rPr lang="en-US" sz="1300" b="1" dirty="0">
+                <a:solidFill>
+                  <a:schemeClr val="bg1"/>
+                </a:solidFill>
+              </a:rPr>
+              <a:t>Rakuten Cash</a:t>
+            </a:r>
+            <a:endParaRPr kumimoji="1" lang="en-US" sz="1300" b="1" dirty="0">
+              <a:solidFill>
+                <a:schemeClr val="bg1"/>
+              </a:solidFill>
+            </a:endParaRPr>
+          </a:p>
+        </p:txBody>
+      </p:sp>
+      <p:sp>
+        <p:nvSpPr>
+          <p:cNvPr id="37" name="正方形/長方形 34">
+            <a:extLst>
+              <a:ext uri="{FF2B5EF4-FFF2-40B4-BE49-F238E27FC236}">
+                <a16:creationId xmlns:a16="http://schemas.microsoft.com/office/drawing/2014/main" id="{7A622987-E48D-26D3-F7EC-ED6CC9EB809A}"/>
+              </a:ext>
+            </a:extLst>
+          </p:cNvPr>
+          <p:cNvSpPr/>
+          <p:nvPr/>
+        </p:nvSpPr>
+        <p:spPr>
+          <a:xfrm>
+            <a:off x="4090125" y="1311510"/>
+            <a:ext cx="1500411" cy="393169"/>
+          </a:xfrm>
+          <a:prstGeom prst="rect">
+            <a:avLst/>
+          </a:prstGeom>
+          <a:solidFill>
+            <a:schemeClr val="accent6">
+              <a:lumMod val="50000"/>
+            </a:schemeClr>
+          </a:solidFill>
+          <a:ln>
+            <a:noFill/>
+          </a:ln>
+        </p:spPr>
+        <p:style>
+          <a:lnRef idx="2">
+            <a:schemeClr val="accent1">
+              <a:shade val="50000"/>
+            </a:schemeClr>
+          </a:lnRef>
+          <a:fillRef idx="1">
+            <a:schemeClr val="accent1"/>
+          </a:fillRef>
+          <a:effectRef idx="0">
+            <a:schemeClr val="accent1"/>
+          </a:effectRef>
+          <a:fontRef idx="minor">
+            <a:schemeClr val="lt1"/>
+          </a:fontRef>
+        </p:style>
+        <p:txBody>
+          <a:bodyPr rtlCol="0" anchor="ctr"/>
+          <a:lstStyle/>
+          <a:p>
+            <a:pPr algn="ctr"/>
+            <a:r>
+              <a:rPr lang="en-US" sz="1300" b="1" dirty="0" err="1">
+                <a:solidFill>
+                  <a:schemeClr val="bg1"/>
+                </a:solidFill>
+              </a:rPr>
+              <a:t>Rpoint</a:t>
+            </a:r>
+            <a:r>
+              <a:rPr lang="en-US" sz="1300" b="1" dirty="0">
+                <a:solidFill>
+                  <a:schemeClr val="bg1"/>
+                </a:solidFill>
+              </a:rPr>
+              <a:t> Usage</a:t>
+            </a:r>
+            <a:endParaRPr kumimoji="1" lang="en-US" sz="1300" b="1" dirty="0">
+              <a:solidFill>
+                <a:schemeClr val="bg1"/>
+              </a:solidFill>
+            </a:endParaRPr>
+          </a:p>
+        </p:txBody>
+      </p:sp>
+      <p:sp>
+        <p:nvSpPr>
+          <p:cNvPr id="38" name="正方形/長方形 34">
+            <a:extLst>
+              <a:ext uri="{FF2B5EF4-FFF2-40B4-BE49-F238E27FC236}">
+                <a16:creationId xmlns:a16="http://schemas.microsoft.com/office/drawing/2014/main" id="{4296E3E7-D05D-116C-EFA6-A45EDD43A779}"/>
+              </a:ext>
+            </a:extLst>
+          </p:cNvPr>
+          <p:cNvSpPr/>
+          <p:nvPr/>
+        </p:nvSpPr>
+        <p:spPr>
+          <a:xfrm>
+            <a:off x="6538720" y="2917594"/>
+            <a:ext cx="1500411" cy="523220"/>
+          </a:xfrm>
+          <a:prstGeom prst="rect">
+            <a:avLst/>
+          </a:prstGeom>
+          <a:solidFill>
+            <a:schemeClr val="accent6">
+              <a:lumMod val="50000"/>
+            </a:schemeClr>
+          </a:solidFill>
+          <a:ln>
+            <a:noFill/>
+          </a:ln>
+        </p:spPr>
+        <p:style>
+          <a:lnRef idx="2">
+            <a:schemeClr val="accent1">
+              <a:shade val="50000"/>
+            </a:schemeClr>
+          </a:lnRef>
+          <a:fillRef idx="1">
+            <a:schemeClr val="accent1"/>
+          </a:fillRef>
+          <a:effectRef idx="0">
+            <a:schemeClr val="accent1"/>
+          </a:effectRef>
+          <a:fontRef idx="minor">
+            <a:schemeClr val="lt1"/>
+          </a:fontRef>
+        </p:style>
+        <p:txBody>
+          <a:bodyPr rtlCol="0" anchor="ctr"/>
+          <a:lstStyle/>
+          <a:p>
+            <a:pPr algn="ctr"/>
+            <a:r>
+              <a:rPr kumimoji="1" lang="en-US" sz="1300" b="1" dirty="0">
+                <a:solidFill>
+                  <a:schemeClr val="bg1"/>
+                </a:solidFill>
+              </a:rPr>
+              <a:t>Charge  Method </a:t>
+            </a:r>
+          </a:p>
+          <a:p>
+            <a:pPr algn="ctr"/>
+            <a:r>
+              <a:rPr lang="en-US" sz="1300" b="1" dirty="0">
+                <a:solidFill>
+                  <a:schemeClr val="bg1"/>
+                </a:solidFill>
+              </a:rPr>
+              <a:t>Selection</a:t>
+            </a:r>
+            <a:endParaRPr kumimoji="1" lang="en-US" sz="1300" b="1" dirty="0">
+              <a:solidFill>
+                <a:schemeClr val="bg1"/>
+              </a:solidFill>
+            </a:endParaRPr>
+          </a:p>
+        </p:txBody>
+      </p:sp>
+      <p:sp>
+        <p:nvSpPr>
+          <p:cNvPr id="39" name="正方形/長方形 34">
+            <a:extLst>
+              <a:ext uri="{FF2B5EF4-FFF2-40B4-BE49-F238E27FC236}">
+                <a16:creationId xmlns:a16="http://schemas.microsoft.com/office/drawing/2014/main" id="{7F17F87F-9212-F230-F7B5-3D36CD3B8612}"/>
+              </a:ext>
+            </a:extLst>
+          </p:cNvPr>
+          <p:cNvSpPr/>
+          <p:nvPr/>
+        </p:nvSpPr>
+        <p:spPr>
+          <a:xfrm>
+            <a:off x="6538719" y="3829210"/>
+            <a:ext cx="1500411" cy="393166"/>
+          </a:xfrm>
+          <a:prstGeom prst="rect">
+            <a:avLst/>
+          </a:prstGeom>
+          <a:solidFill>
+            <a:schemeClr val="accent6">
+              <a:lumMod val="50000"/>
+            </a:schemeClr>
+          </a:solidFill>
+          <a:ln>
+            <a:noFill/>
+          </a:ln>
+        </p:spPr>
+        <p:style>
+          <a:lnRef idx="2">
+            <a:schemeClr val="accent1">
+              <a:shade val="50000"/>
+            </a:schemeClr>
+          </a:lnRef>
+          <a:fillRef idx="1">
+            <a:schemeClr val="accent1"/>
+          </a:fillRef>
+          <a:effectRef idx="0">
+            <a:schemeClr val="accent1"/>
+          </a:effectRef>
+          <a:fontRef idx="minor">
+            <a:schemeClr val="lt1"/>
+          </a:fontRef>
+        </p:style>
+        <p:txBody>
+          <a:bodyPr rtlCol="0" anchor="ctr"/>
+          <a:lstStyle/>
+          <a:p>
+            <a:pPr algn="ctr"/>
+            <a:r>
+              <a:rPr kumimoji="1" lang="en-US" sz="1300" b="1" dirty="0">
+                <a:solidFill>
+                  <a:schemeClr val="bg1"/>
+                </a:solidFill>
+              </a:rPr>
+              <a:t>Charge  </a:t>
+            </a:r>
+            <a:r>
+              <a:rPr kumimoji="1" lang="en-US" sz="1300" b="1" dirty="0" err="1">
+                <a:solidFill>
+                  <a:schemeClr val="bg1"/>
+                </a:solidFill>
+              </a:rPr>
+              <a:t>Hostory</a:t>
+            </a:r>
+            <a:r>
+              <a:rPr kumimoji="1" lang="en-US" sz="1300" b="1" dirty="0">
+                <a:solidFill>
+                  <a:schemeClr val="bg1"/>
+                </a:solidFill>
+              </a:rPr>
+              <a:t> </a:t>
+            </a:r>
+          </a:p>
+        </p:txBody>
+      </p:sp>
+      <p:sp>
+        <p:nvSpPr>
+          <p:cNvPr id="40" name="正方形/長方形 34">
+            <a:extLst>
+              <a:ext uri="{FF2B5EF4-FFF2-40B4-BE49-F238E27FC236}">
+                <a16:creationId xmlns:a16="http://schemas.microsoft.com/office/drawing/2014/main" id="{1F9DC17D-888D-C7C7-98E8-94CB8BC2C6CF}"/>
+              </a:ext>
+            </a:extLst>
+          </p:cNvPr>
+          <p:cNvSpPr/>
+          <p:nvPr/>
+        </p:nvSpPr>
+        <p:spPr>
+          <a:xfrm>
+            <a:off x="4090125" y="5348646"/>
+            <a:ext cx="1500411" cy="393169"/>
+          </a:xfrm>
+          <a:prstGeom prst="rect">
+            <a:avLst/>
+          </a:prstGeom>
+          <a:solidFill>
+            <a:schemeClr val="accent6">
+              <a:lumMod val="50000"/>
+            </a:schemeClr>
+          </a:solidFill>
+          <a:ln>
+            <a:noFill/>
+          </a:ln>
+        </p:spPr>
+        <p:style>
+          <a:lnRef idx="2">
+            <a:schemeClr val="accent1">
+              <a:shade val="50000"/>
+            </a:schemeClr>
+          </a:lnRef>
+          <a:fillRef idx="1">
+            <a:schemeClr val="accent1"/>
+          </a:fillRef>
+          <a:effectRef idx="0">
+            <a:schemeClr val="accent1"/>
+          </a:effectRef>
+          <a:fontRef idx="minor">
+            <a:schemeClr val="lt1"/>
+          </a:fontRef>
+        </p:style>
+        <p:txBody>
+          <a:bodyPr rtlCol="0" anchor="ctr"/>
+          <a:lstStyle/>
+          <a:p>
+            <a:pPr algn="ctr"/>
+            <a:r>
+              <a:rPr kumimoji="1" lang="en-US" sz="1300" b="1" dirty="0">
+                <a:solidFill>
+                  <a:schemeClr val="bg1"/>
+                </a:solidFill>
+              </a:rPr>
+              <a:t>Setting</a:t>
+            </a:r>
+          </a:p>
+        </p:txBody>
+      </p:sp>
+      <p:sp>
+        <p:nvSpPr>
+          <p:cNvPr id="41" name="正方形/長方形 34">
+            <a:extLst>
+              <a:ext uri="{FF2B5EF4-FFF2-40B4-BE49-F238E27FC236}">
+                <a16:creationId xmlns:a16="http://schemas.microsoft.com/office/drawing/2014/main" id="{3C953E21-89B5-C844-1D15-C19DB2129A47}"/>
+              </a:ext>
+            </a:extLst>
+          </p:cNvPr>
+          <p:cNvSpPr/>
+          <p:nvPr/>
+        </p:nvSpPr>
+        <p:spPr>
+          <a:xfrm>
+            <a:off x="4090125" y="6010736"/>
+            <a:ext cx="1500411" cy="393167"/>
+          </a:xfrm>
+          <a:prstGeom prst="rect">
+            <a:avLst/>
+          </a:prstGeom>
+          <a:solidFill>
+            <a:schemeClr val="accent6">
+              <a:lumMod val="50000"/>
+            </a:schemeClr>
+          </a:solidFill>
+          <a:ln>
+            <a:noFill/>
+          </a:ln>
+        </p:spPr>
+        <p:style>
+          <a:lnRef idx="2">
+            <a:schemeClr val="accent1">
+              <a:shade val="50000"/>
+            </a:schemeClr>
+          </a:lnRef>
+          <a:fillRef idx="1">
+            <a:schemeClr val="accent1"/>
+          </a:fillRef>
+          <a:effectRef idx="0">
+            <a:schemeClr val="accent1"/>
+          </a:effectRef>
+          <a:fontRef idx="minor">
+            <a:schemeClr val="lt1"/>
+          </a:fontRef>
+        </p:style>
+        <p:txBody>
+          <a:bodyPr rtlCol="0" anchor="ctr"/>
+          <a:lstStyle/>
+          <a:p>
+            <a:pPr algn="ctr"/>
+            <a:r>
+              <a:rPr kumimoji="1" lang="en-US" sz="1300" b="1" dirty="0">
+                <a:solidFill>
+                  <a:schemeClr val="bg1"/>
+                </a:solidFill>
+              </a:rPr>
+              <a:t>Re login</a:t>
+            </a:r>
+          </a:p>
+        </p:txBody>
+      </p:sp>
+      <p:cxnSp>
+        <p:nvCxnSpPr>
+          <p:cNvPr id="45" name="Elbow Connector 44">
+            <a:extLst>
+              <a:ext uri="{FF2B5EF4-FFF2-40B4-BE49-F238E27FC236}">
+                <a16:creationId xmlns:a16="http://schemas.microsoft.com/office/drawing/2014/main" id="{CAD57B1D-92DA-E867-5351-478E5320596C}"/>
+              </a:ext>
+            </a:extLst>
+          </p:cNvPr>
+          <p:cNvCxnSpPr>
+            <a:cxnSpLocks/>
+            <a:stCxn id="36" idx="3"/>
+            <a:endCxn id="35" idx="1"/>
+          </p:cNvCxnSpPr>
+          <p:nvPr/>
+        </p:nvCxnSpPr>
+        <p:spPr>
+          <a:xfrm flipV="1">
+            <a:off x="3141940" y="3625585"/>
+            <a:ext cx="948185" cy="357843"/>
+          </a:xfrm>
+          <a:prstGeom prst="bentConnector3">
+            <a:avLst/>
+          </a:prstGeom>
+          <a:ln w="19050">
+            <a:tailEnd type="triangle"/>
+          </a:ln>
+        </p:spPr>
+        <p:style>
+          <a:lnRef idx="1">
+            <a:schemeClr val="dk1"/>
+          </a:lnRef>
+          <a:fillRef idx="0">
+            <a:schemeClr val="dk1"/>
+          </a:fillRef>
+          <a:effectRef idx="0">
+            <a:schemeClr val="dk1"/>
+          </a:effectRef>
+          <a:fontRef idx="minor">
+            <a:schemeClr val="tx1"/>
+          </a:fontRef>
+        </p:style>
+      </p:cxnSp>
+      <p:cxnSp>
+        <p:nvCxnSpPr>
+          <p:cNvPr id="46" name="Elbow Connector 45">
+            <a:extLst>
+              <a:ext uri="{FF2B5EF4-FFF2-40B4-BE49-F238E27FC236}">
+                <a16:creationId xmlns:a16="http://schemas.microsoft.com/office/drawing/2014/main" id="{45568D64-0AE6-DB24-8612-89BF8425311C}"/>
+              </a:ext>
+            </a:extLst>
+          </p:cNvPr>
+          <p:cNvCxnSpPr>
+            <a:cxnSpLocks/>
+            <a:stCxn id="3" idx="3"/>
+            <a:endCxn id="6" idx="1"/>
+          </p:cNvCxnSpPr>
+          <p:nvPr/>
+        </p:nvCxnSpPr>
+        <p:spPr>
+          <a:xfrm>
+            <a:off x="3141940" y="1998484"/>
+            <a:ext cx="948185" cy="479829"/>
+          </a:xfrm>
+          <a:prstGeom prst="bentConnector3">
+            <a:avLst/>
+          </a:prstGeom>
+          <a:ln w="19050">
+            <a:tailEnd type="triangle"/>
+          </a:ln>
+        </p:spPr>
+        <p:style>
+          <a:lnRef idx="1">
+            <a:schemeClr val="dk1"/>
+          </a:lnRef>
+          <a:fillRef idx="0">
+            <a:schemeClr val="dk1"/>
+          </a:fillRef>
+          <a:effectRef idx="0">
+            <a:schemeClr val="dk1"/>
+          </a:effectRef>
+          <a:fontRef idx="minor">
+            <a:schemeClr val="tx1"/>
+          </a:fontRef>
+        </p:style>
+      </p:cxnSp>
+      <p:cxnSp>
+        <p:nvCxnSpPr>
+          <p:cNvPr id="53" name="Elbow Connector 52">
+            <a:extLst>
+              <a:ext uri="{FF2B5EF4-FFF2-40B4-BE49-F238E27FC236}">
+                <a16:creationId xmlns:a16="http://schemas.microsoft.com/office/drawing/2014/main" id="{3677F2C6-BB29-6513-284D-528B1B6EF451}"/>
+              </a:ext>
+            </a:extLst>
+          </p:cNvPr>
+          <p:cNvCxnSpPr>
+            <a:cxnSpLocks/>
+            <a:stCxn id="35" idx="3"/>
+            <a:endCxn id="38" idx="1"/>
+          </p:cNvCxnSpPr>
+          <p:nvPr/>
+        </p:nvCxnSpPr>
+        <p:spPr>
+          <a:xfrm flipV="1">
+            <a:off x="5590536" y="3179204"/>
+            <a:ext cx="948184" cy="446381"/>
+          </a:xfrm>
+          <a:prstGeom prst="bentConnector3">
+            <a:avLst>
+              <a:gd name="adj1" fmla="val 50000"/>
+            </a:avLst>
+          </a:prstGeom>
+          <a:ln w="19050">
+            <a:tailEnd type="triangle"/>
+          </a:ln>
+        </p:spPr>
+        <p:style>
+          <a:lnRef idx="1">
+            <a:schemeClr val="dk1"/>
+          </a:lnRef>
+          <a:fillRef idx="0">
+            <a:schemeClr val="dk1"/>
+          </a:fillRef>
+          <a:effectRef idx="0">
+            <a:schemeClr val="dk1"/>
+          </a:effectRef>
+          <a:fontRef idx="minor">
+            <a:schemeClr val="tx1"/>
+          </a:fontRef>
+        </p:style>
+      </p:cxnSp>
+      <p:cxnSp>
+        <p:nvCxnSpPr>
+          <p:cNvPr id="56" name="Elbow Connector 55">
+            <a:extLst>
+              <a:ext uri="{FF2B5EF4-FFF2-40B4-BE49-F238E27FC236}">
+                <a16:creationId xmlns:a16="http://schemas.microsoft.com/office/drawing/2014/main" id="{F6E18B4B-DC0D-72CE-BE0C-63FFD7C445C9}"/>
+              </a:ext>
+            </a:extLst>
+          </p:cNvPr>
+          <p:cNvCxnSpPr>
+            <a:cxnSpLocks/>
+            <a:stCxn id="35" idx="3"/>
+            <a:endCxn id="39" idx="1"/>
+          </p:cNvCxnSpPr>
+          <p:nvPr/>
+        </p:nvCxnSpPr>
+        <p:spPr>
+          <a:xfrm>
+            <a:off x="5590536" y="3625585"/>
+            <a:ext cx="948183" cy="400208"/>
+          </a:xfrm>
+          <a:prstGeom prst="bentConnector3">
+            <a:avLst>
+              <a:gd name="adj1" fmla="val 50000"/>
+            </a:avLst>
+          </a:prstGeom>
+          <a:ln w="19050">
+            <a:tailEnd type="triangle"/>
+          </a:ln>
+        </p:spPr>
+        <p:style>
+          <a:lnRef idx="1">
+            <a:schemeClr val="dk1"/>
+          </a:lnRef>
+          <a:fillRef idx="0">
+            <a:schemeClr val="dk1"/>
+          </a:fillRef>
+          <a:effectRef idx="0">
+            <a:schemeClr val="dk1"/>
+          </a:effectRef>
+          <a:fontRef idx="minor">
+            <a:schemeClr val="tx1"/>
+          </a:fontRef>
+        </p:style>
+      </p:cxnSp>
+      <p:cxnSp>
+        <p:nvCxnSpPr>
+          <p:cNvPr id="59" name="Elbow Connector 58">
+            <a:extLst>
+              <a:ext uri="{FF2B5EF4-FFF2-40B4-BE49-F238E27FC236}">
+                <a16:creationId xmlns:a16="http://schemas.microsoft.com/office/drawing/2014/main" id="{4A3C6248-66B2-6AC5-D730-70DB8C2E3215}"/>
+              </a:ext>
+            </a:extLst>
+          </p:cNvPr>
+          <p:cNvCxnSpPr>
+            <a:cxnSpLocks/>
+            <a:stCxn id="3" idx="3"/>
+            <a:endCxn id="37" idx="1"/>
+          </p:cNvCxnSpPr>
+          <p:nvPr/>
+        </p:nvCxnSpPr>
+        <p:spPr>
+          <a:xfrm flipV="1">
+            <a:off x="3141940" y="1508095"/>
+            <a:ext cx="948185" cy="490389"/>
+          </a:xfrm>
+          <a:prstGeom prst="bentConnector3">
+            <a:avLst/>
+          </a:prstGeom>
+          <a:ln w="19050">
+            <a:tailEnd type="triangle"/>
+          </a:ln>
+        </p:spPr>
+        <p:style>
+          <a:lnRef idx="1">
+            <a:schemeClr val="dk1"/>
+          </a:lnRef>
+          <a:fillRef idx="0">
+            <a:schemeClr val="dk1"/>
+          </a:fillRef>
+          <a:effectRef idx="0">
+            <a:schemeClr val="dk1"/>
+          </a:effectRef>
+          <a:fontRef idx="minor">
+            <a:schemeClr val="tx1"/>
+          </a:fontRef>
+        </p:style>
+      </p:cxnSp>
+      <p:cxnSp>
+        <p:nvCxnSpPr>
+          <p:cNvPr id="62" name="Elbow Connector 61">
+            <a:extLst>
+              <a:ext uri="{FF2B5EF4-FFF2-40B4-BE49-F238E27FC236}">
+                <a16:creationId xmlns:a16="http://schemas.microsoft.com/office/drawing/2014/main" id="{F97057F3-BE76-3B89-5755-E5E3ECEF0A4E}"/>
+              </a:ext>
+            </a:extLst>
+          </p:cNvPr>
+          <p:cNvCxnSpPr>
+            <a:cxnSpLocks/>
+            <a:stCxn id="34" idx="3"/>
+            <a:endCxn id="13" idx="1"/>
+          </p:cNvCxnSpPr>
+          <p:nvPr/>
+        </p:nvCxnSpPr>
+        <p:spPr>
+          <a:xfrm flipV="1">
+            <a:off x="3468030" y="4716213"/>
+            <a:ext cx="622095" cy="1067965"/>
+          </a:xfrm>
+          <a:prstGeom prst="bentConnector3">
+            <a:avLst>
+              <a:gd name="adj1" fmla="val 50000"/>
+            </a:avLst>
+          </a:prstGeom>
+          <a:ln w="19050">
+            <a:tailEnd type="triangle"/>
+          </a:ln>
+        </p:spPr>
+        <p:style>
+          <a:lnRef idx="1">
+            <a:schemeClr val="dk1"/>
+          </a:lnRef>
+          <a:fillRef idx="0">
+            <a:schemeClr val="dk1"/>
+          </a:fillRef>
+          <a:effectRef idx="0">
+            <a:schemeClr val="dk1"/>
+          </a:effectRef>
+          <a:fontRef idx="minor">
+            <a:schemeClr val="tx1"/>
+          </a:fontRef>
+        </p:style>
+      </p:cxnSp>
+      <p:cxnSp>
+        <p:nvCxnSpPr>
+          <p:cNvPr id="65" name="Elbow Connector 64">
+            <a:extLst>
+              <a:ext uri="{FF2B5EF4-FFF2-40B4-BE49-F238E27FC236}">
+                <a16:creationId xmlns:a16="http://schemas.microsoft.com/office/drawing/2014/main" id="{E55423E4-E052-FC3C-62FD-3675F79084D5}"/>
+              </a:ext>
+            </a:extLst>
+          </p:cNvPr>
+          <p:cNvCxnSpPr>
+            <a:cxnSpLocks/>
+            <a:stCxn id="34" idx="3"/>
+            <a:endCxn id="40" idx="1"/>
+          </p:cNvCxnSpPr>
+          <p:nvPr/>
+        </p:nvCxnSpPr>
+        <p:spPr>
+          <a:xfrm flipV="1">
+            <a:off x="3468030" y="5545231"/>
+            <a:ext cx="622095" cy="238947"/>
+          </a:xfrm>
+          <a:prstGeom prst="bentConnector3">
+            <a:avLst>
+              <a:gd name="adj1" fmla="val 50000"/>
+            </a:avLst>
+          </a:prstGeom>
+          <a:ln w="19050">
+            <a:tailEnd type="triangle"/>
+          </a:ln>
+        </p:spPr>
+        <p:style>
+          <a:lnRef idx="1">
+            <a:schemeClr val="dk1"/>
+          </a:lnRef>
+          <a:fillRef idx="0">
+            <a:schemeClr val="dk1"/>
+          </a:fillRef>
+          <a:effectRef idx="0">
+            <a:schemeClr val="dk1"/>
+          </a:effectRef>
+          <a:fontRef idx="minor">
+            <a:schemeClr val="tx1"/>
+          </a:fontRef>
+        </p:style>
+      </p:cxnSp>
+      <p:cxnSp>
+        <p:nvCxnSpPr>
+          <p:cNvPr id="68" name="Elbow Connector 67">
+            <a:extLst>
+              <a:ext uri="{FF2B5EF4-FFF2-40B4-BE49-F238E27FC236}">
+                <a16:creationId xmlns:a16="http://schemas.microsoft.com/office/drawing/2014/main" id="{26BB818A-1869-5C68-DBE2-B40D7CD4337B}"/>
+              </a:ext>
+            </a:extLst>
+          </p:cNvPr>
+          <p:cNvCxnSpPr>
+            <a:cxnSpLocks/>
+            <a:stCxn id="34" idx="3"/>
+            <a:endCxn id="41" idx="1"/>
+          </p:cNvCxnSpPr>
+          <p:nvPr/>
+        </p:nvCxnSpPr>
+        <p:spPr>
+          <a:xfrm>
+            <a:off x="3468030" y="5784178"/>
+            <a:ext cx="622095" cy="423142"/>
+          </a:xfrm>
+          <a:prstGeom prst="bentConnector3">
+            <a:avLst>
+              <a:gd name="adj1" fmla="val 50000"/>
+            </a:avLst>
+          </a:prstGeom>
+          <a:ln w="19050">
+            <a:tailEnd type="triangle"/>
+          </a:ln>
+        </p:spPr>
+        <p:style>
+          <a:lnRef idx="1">
+            <a:schemeClr val="dk1"/>
+          </a:lnRef>
+          <a:fillRef idx="0">
+            <a:schemeClr val="dk1"/>
+          </a:fillRef>
+          <a:effectRef idx="0">
+            <a:schemeClr val="dk1"/>
+          </a:effectRef>
+          <a:fontRef idx="minor">
+            <a:schemeClr val="tx1"/>
+          </a:fontRef>
+        </p:style>
+      </p:cxnSp>
+      <p:sp>
+        <p:nvSpPr>
+          <p:cNvPr id="73" name="Rectangle 72">
+            <a:extLst>
+              <a:ext uri="{FF2B5EF4-FFF2-40B4-BE49-F238E27FC236}">
+                <a16:creationId xmlns:a16="http://schemas.microsoft.com/office/drawing/2014/main" id="{49480547-3F21-28B1-4F90-9CEF8CE52B25}"/>
+              </a:ext>
+            </a:extLst>
+          </p:cNvPr>
+          <p:cNvSpPr/>
+          <p:nvPr/>
+        </p:nvSpPr>
+        <p:spPr>
+          <a:xfrm>
+            <a:off x="1545923" y="1068967"/>
+            <a:ext cx="4330770" cy="1710027"/>
+          </a:xfrm>
+          <a:prstGeom prst="rect">
+            <a:avLst/>
+          </a:prstGeom>
+          <a:noFill/>
+          <a:ln w="19050">
+            <a:solidFill>
+              <a:srgbClr val="FF0000"/>
+            </a:solidFill>
+          </a:ln>
+        </p:spPr>
+        <p:style>
+          <a:lnRef idx="2">
+            <a:schemeClr val="accent1">
+              <a:shade val="50000"/>
+            </a:schemeClr>
+          </a:lnRef>
+          <a:fillRef idx="1">
+            <a:schemeClr val="accent1"/>
+          </a:fillRef>
+          <a:effectRef idx="0">
+            <a:schemeClr val="accent1"/>
+          </a:effectRef>
+          <a:fontRef idx="minor">
+            <a:schemeClr val="lt1"/>
+          </a:fontRef>
+        </p:style>
+        <p:txBody>
+          <a:bodyPr rtlCol="0" anchor="ctr"/>
+          <a:lstStyle/>
+          <a:p>
+            <a:pPr algn="ctr"/>
+            <a:endParaRPr kumimoji="1" lang="en-JP" dirty="0"/>
+          </a:p>
+        </p:txBody>
+      </p:sp>
+      <p:sp>
+        <p:nvSpPr>
+          <p:cNvPr id="74" name="Rectangle 73">
+            <a:extLst>
+              <a:ext uri="{FF2B5EF4-FFF2-40B4-BE49-F238E27FC236}">
+                <a16:creationId xmlns:a16="http://schemas.microsoft.com/office/drawing/2014/main" id="{F12A089C-5B39-DE58-954C-5B06D6C111EF}"/>
+              </a:ext>
+            </a:extLst>
+          </p:cNvPr>
+          <p:cNvSpPr/>
+          <p:nvPr/>
+        </p:nvSpPr>
+        <p:spPr>
+          <a:xfrm>
+            <a:off x="3930615" y="2896111"/>
+            <a:ext cx="4330770" cy="1551177"/>
+          </a:xfrm>
+          <a:prstGeom prst="rect">
+            <a:avLst/>
+          </a:prstGeom>
+          <a:noFill/>
+          <a:ln w="19050">
+            <a:solidFill>
+              <a:srgbClr val="FF0000"/>
+            </a:solidFill>
+          </a:ln>
+        </p:spPr>
+        <p:style>
+          <a:lnRef idx="2">
+            <a:schemeClr val="accent1">
+              <a:shade val="50000"/>
+            </a:schemeClr>
+          </a:lnRef>
+          <a:fillRef idx="1">
+            <a:schemeClr val="accent1"/>
+          </a:fillRef>
+          <a:effectRef idx="0">
+            <a:schemeClr val="accent1"/>
+          </a:effectRef>
+          <a:fontRef idx="minor">
+            <a:schemeClr val="lt1"/>
+          </a:fontRef>
+        </p:style>
+        <p:txBody>
+          <a:bodyPr rtlCol="0" anchor="ctr"/>
+          <a:lstStyle/>
+          <a:p>
+            <a:pPr algn="ctr"/>
+            <a:endParaRPr kumimoji="1" lang="en-JP" dirty="0"/>
+          </a:p>
+        </p:txBody>
+      </p:sp>
+    </p:spTree>
+    <p:extLst>
+      <p:ext uri="{BB962C8B-B14F-4D97-AF65-F5344CB8AC3E}">
+        <p14:creationId xmlns:p14="http://schemas.microsoft.com/office/powerpoint/2010/main" val="1524952884"/>
+      </p:ext>
+    </p:extLst>
+  </p:cSld>
+  <p:clrMapOvr>
+    <a:masterClrMapping/>
+  </p:clrMapOvr>
+</p:sld>
+</file>
+
+<file path=ppt/slides/slide7.xml><?xml version="1.0" encoding="utf-8"?>
+<p:sld xmlns:a="http://schemas.openxmlformats.org/drawingml/2006/main" xmlns:r="http://schemas.openxmlformats.org/officeDocument/2006/relationships" xmlns:p="http://schemas.openxmlformats.org/presentationml/2006/main">
+  <p:cSld>
+    <p:spTree>
+      <p:nvGrpSpPr>
+        <p:cNvPr id="1" name=""/>
+        <p:cNvGrpSpPr/>
+        <p:nvPr/>
+      </p:nvGrpSpPr>
+      <p:grpSpPr>
+        <a:xfrm>
+          <a:off x="0" y="0"/>
+          <a:ext cx="0" cy="0"/>
+          <a:chOff x="0" y="0"/>
+          <a:chExt cx="0" cy="0"/>
+        </a:xfrm>
+      </p:grpSpPr>
+      <p:sp>
+        <p:nvSpPr>
+          <p:cNvPr id="2" name="タイトル 1"/>
+          <p:cNvSpPr>
+            <a:spLocks noGrp="1"/>
+          </p:cNvSpPr>
+          <p:nvPr>
+            <p:ph type="title"/>
+          </p:nvPr>
+        </p:nvSpPr>
+        <p:spPr/>
+        <p:txBody>
+          <a:bodyPr>
+            <a:noAutofit/>
+          </a:bodyPr>
+          <a:lstStyle/>
+          <a:p>
+            <a:pPr algn="ctr"/>
+            <a:r>
+              <a:rPr lang="en-JP" altLang="ja-JP" sz="3600" b="1" kern="0" dirty="0"/>
               <a:t>How to seperate</a:t>
             </a:r>
             <a:endParaRPr lang="ja-JP" altLang="en-US" sz="3600" b="1" kern="0" dirty="0"/>
@@ -7445,7 +9463,7 @@
 </p:sld>
 </file>
 
-<file path=ppt/slides/slide6.xml><?xml version="1.0" encoding="utf-8"?>
+<file path=ppt/slides/slide8.xml><?xml version="1.0" encoding="utf-8"?>
 <p:sld xmlns:a="http://schemas.openxmlformats.org/drawingml/2006/main" xmlns:r="http://schemas.openxmlformats.org/officeDocument/2006/relationships" xmlns:p="http://schemas.openxmlformats.org/presentationml/2006/main">
   <p:cSld>
     <p:spTree>

</xml_diff>